<commit_message>
File Input lecture update
</commit_message>
<xml_diff>
--- a/slides/On-Campus/07_01_FileInput.pptx
+++ b/slides/On-Campus/07_01_FileInput.pptx
@@ -152,1234 +152,55 @@
 <pc:chgInfo xmlns:a="http://schemas.openxmlformats.org/drawingml/2006/main" xmlns:r="http://schemas.openxmlformats.org/officeDocument/2006/relationships" xmlns:ac="http://schemas.microsoft.com/office/drawing/2013/main/command" xmlns:pc="http://schemas.microsoft.com/office/powerpoint/2013/main/command">
   <pc:docChgLst>
     <pc:chgData name="Marcia Moraes" userId="c9c67e8a-58e2-4733-9a1c-5d44fec4775b" providerId="ADAL" clId="{65A51C50-0255-4629-87C5-E90858C71A63}"/>
-    <pc:docChg chg="undo custSel addSld delSld modSld sldOrd modMainMaster">
-      <pc:chgData name="Marcia Moraes" userId="c9c67e8a-58e2-4733-9a1c-5d44fec4775b" providerId="ADAL" clId="{65A51C50-0255-4629-87C5-E90858C71A63}" dt="2023-02-26T21:38:11.217" v="2149"/>
+  </pc:docChgLst>
+  <pc:docChgLst>
+    <pc:chgData name="Marcia Moraes" userId="c9c67e8a-58e2-4733-9a1c-5d44fec4775b" providerId="ADAL" clId="{0B329C1D-C484-4E29-AB46-188B481F43A0}"/>
+  </pc:docChgLst>
+  <pc:docChgLst>
+    <pc:chgData name="Marcia Moraes" userId="c9c67e8a-58e2-4733-9a1c-5d44fec4775b" providerId="ADAL" clId="{E45C26DC-0BD9-4717-BFEB-54C307A378F6}"/>
+    <pc:docChg chg="custSel modSld">
+      <pc:chgData name="Marcia Moraes" userId="c9c67e8a-58e2-4733-9a1c-5d44fec4775b" providerId="ADAL" clId="{E45C26DC-0BD9-4717-BFEB-54C307A378F6}" dt="2023-09-14T14:07:40.724" v="120" actId="1076"/>
       <pc:docMkLst>
         <pc:docMk/>
       </pc:docMkLst>
-      <pc:sldChg chg="del">
-        <pc:chgData name="Marcia Moraes" userId="c9c67e8a-58e2-4733-9a1c-5d44fec4775b" providerId="ADAL" clId="{65A51C50-0255-4629-87C5-E90858C71A63}" dt="2023-02-26T21:06:31.258" v="1982" actId="2696"/>
-        <pc:sldMkLst>
-          <pc:docMk/>
-          <pc:sldMk cId="1620380962" sldId="257"/>
-        </pc:sldMkLst>
-      </pc:sldChg>
-      <pc:sldChg chg="del">
-        <pc:chgData name="Marcia Moraes" userId="c9c67e8a-58e2-4733-9a1c-5d44fec4775b" providerId="ADAL" clId="{65A51C50-0255-4629-87C5-E90858C71A63}" dt="2023-02-26T21:06:33.606" v="1983" actId="2696"/>
-        <pc:sldMkLst>
-          <pc:docMk/>
-          <pc:sldMk cId="2845291675" sldId="258"/>
-        </pc:sldMkLst>
-      </pc:sldChg>
-      <pc:sldChg chg="del">
-        <pc:chgData name="Marcia Moraes" userId="c9c67e8a-58e2-4733-9a1c-5d44fec4775b" providerId="ADAL" clId="{65A51C50-0255-4629-87C5-E90858C71A63}" dt="2023-02-26T21:06:34.847" v="1984" actId="2696"/>
-        <pc:sldMkLst>
-          <pc:docMk/>
-          <pc:sldMk cId="3156393563" sldId="259"/>
-        </pc:sldMkLst>
-      </pc:sldChg>
-      <pc:sldChg chg="del">
-        <pc:chgData name="Marcia Moraes" userId="c9c67e8a-58e2-4733-9a1c-5d44fec4775b" providerId="ADAL" clId="{65A51C50-0255-4629-87C5-E90858C71A63}" dt="2023-02-26T21:06:38.652" v="1985" actId="2696"/>
-        <pc:sldMkLst>
-          <pc:docMk/>
-          <pc:sldMk cId="2398376588" sldId="260"/>
-        </pc:sldMkLst>
-      </pc:sldChg>
-      <pc:sldChg chg="del">
-        <pc:chgData name="Marcia Moraes" userId="c9c67e8a-58e2-4733-9a1c-5d44fec4775b" providerId="ADAL" clId="{65A51C50-0255-4629-87C5-E90858C71A63}" dt="2023-02-26T21:06:40.272" v="1986" actId="2696"/>
-        <pc:sldMkLst>
-          <pc:docMk/>
-          <pc:sldMk cId="4232400343" sldId="261"/>
-        </pc:sldMkLst>
-      </pc:sldChg>
-      <pc:sldChg chg="del">
-        <pc:chgData name="Marcia Moraes" userId="c9c67e8a-58e2-4733-9a1c-5d44fec4775b" providerId="ADAL" clId="{65A51C50-0255-4629-87C5-E90858C71A63}" dt="2023-02-26T21:06:44.942" v="1987" actId="2696"/>
-        <pc:sldMkLst>
-          <pc:docMk/>
-          <pc:sldMk cId="3006584024" sldId="262"/>
-        </pc:sldMkLst>
-      </pc:sldChg>
-      <pc:sldChg chg="del">
-        <pc:chgData name="Marcia Moraes" userId="c9c67e8a-58e2-4733-9a1c-5d44fec4775b" providerId="ADAL" clId="{65A51C50-0255-4629-87C5-E90858C71A63}" dt="2023-02-26T21:06:46.169" v="1988" actId="2696"/>
-        <pc:sldMkLst>
-          <pc:docMk/>
-          <pc:sldMk cId="1476890346" sldId="263"/>
-        </pc:sldMkLst>
-      </pc:sldChg>
-      <pc:sldChg chg="addSp delSp modSp">
-        <pc:chgData name="Marcia Moraes" userId="c9c67e8a-58e2-4733-9a1c-5d44fec4775b" providerId="ADAL" clId="{65A51C50-0255-4629-87C5-E90858C71A63}" dt="2023-02-26T18:20:41.003" v="314" actId="1076"/>
-        <pc:sldMkLst>
-          <pc:docMk/>
-          <pc:sldMk cId="1011463358" sldId="264"/>
-        </pc:sldMkLst>
-        <pc:spChg chg="add del mod">
-          <ac:chgData name="Marcia Moraes" userId="c9c67e8a-58e2-4733-9a1c-5d44fec4775b" providerId="ADAL" clId="{65A51C50-0255-4629-87C5-E90858C71A63}" dt="2023-02-26T18:19:28.102" v="302"/>
-          <ac:spMkLst>
-            <pc:docMk/>
-            <pc:sldMk cId="1011463358" sldId="264"/>
-            <ac:spMk id="2" creationId="{B0659711-F30E-41B7-BC63-DE7FF03FE004}"/>
-          </ac:spMkLst>
-        </pc:spChg>
-        <pc:spChg chg="add mod">
-          <ac:chgData name="Marcia Moraes" userId="c9c67e8a-58e2-4733-9a1c-5d44fec4775b" providerId="ADAL" clId="{65A51C50-0255-4629-87C5-E90858C71A63}" dt="2023-02-26T18:20:30.221" v="313" actId="1076"/>
-          <ac:spMkLst>
-            <pc:docMk/>
-            <pc:sldMk cId="1011463358" sldId="264"/>
-            <ac:spMk id="3" creationId="{85221225-9A6E-4169-BB19-EC833AAC9F1B}"/>
-          </ac:spMkLst>
-        </pc:spChg>
-        <pc:spChg chg="mod">
-          <ac:chgData name="Marcia Moraes" userId="c9c67e8a-58e2-4733-9a1c-5d44fec4775b" providerId="ADAL" clId="{65A51C50-0255-4629-87C5-E90858C71A63}" dt="2023-02-26T18:09:38.793" v="267" actId="6549"/>
-          <ac:spMkLst>
-            <pc:docMk/>
-            <pc:sldMk cId="1011463358" sldId="264"/>
-            <ac:spMk id="4" creationId="{683FFEF0-EAC6-454C-9E58-568E0B3AD6FB}"/>
-          </ac:spMkLst>
-        </pc:spChg>
-        <pc:spChg chg="mod">
-          <ac:chgData name="Marcia Moraes" userId="c9c67e8a-58e2-4733-9a1c-5d44fec4775b" providerId="ADAL" clId="{65A51C50-0255-4629-87C5-E90858C71A63}" dt="2023-02-26T18:20:41.003" v="314" actId="1076"/>
-          <ac:spMkLst>
-            <pc:docMk/>
-            <pc:sldMk cId="1011463358" sldId="264"/>
-            <ac:spMk id="5" creationId="{B14CD88C-B718-634B-8318-80188AABD775}"/>
-          </ac:spMkLst>
-        </pc:spChg>
-        <pc:picChg chg="add mod">
-          <ac:chgData name="Marcia Moraes" userId="c9c67e8a-58e2-4733-9a1c-5d44fec4775b" providerId="ADAL" clId="{65A51C50-0255-4629-87C5-E90858C71A63}" dt="2023-02-26T18:20:41.003" v="314" actId="1076"/>
-          <ac:picMkLst>
-            <pc:docMk/>
-            <pc:sldMk cId="1011463358" sldId="264"/>
-            <ac:picMk id="2050" creationId="{C488E6A0-6A8E-444E-A637-56F113AA9BF0}"/>
-          </ac:picMkLst>
-        </pc:picChg>
-        <pc:picChg chg="add del mod">
-          <ac:chgData name="Marcia Moraes" userId="c9c67e8a-58e2-4733-9a1c-5d44fec4775b" providerId="ADAL" clId="{65A51C50-0255-4629-87C5-E90858C71A63}" dt="2023-02-26T18:19:26.950" v="300"/>
-          <ac:picMkLst>
-            <pc:docMk/>
-            <pc:sldMk cId="1011463358" sldId="264"/>
-            <ac:picMk id="2052" creationId="{69E95A06-BA68-4623-A127-F2B2BAF9A4E7}"/>
-          </ac:picMkLst>
-        </pc:picChg>
-        <pc:picChg chg="add mod">
-          <ac:chgData name="Marcia Moraes" userId="c9c67e8a-58e2-4733-9a1c-5d44fec4775b" providerId="ADAL" clId="{65A51C50-0255-4629-87C5-E90858C71A63}" dt="2023-02-26T18:20:41.003" v="314" actId="1076"/>
-          <ac:picMkLst>
-            <pc:docMk/>
-            <pc:sldMk cId="1011463358" sldId="264"/>
-            <ac:picMk id="2054" creationId="{E78F3128-1391-4DF9-A51B-DC175E9ACD04}"/>
-          </ac:picMkLst>
-        </pc:picChg>
-      </pc:sldChg>
-      <pc:sldChg chg="addSp delSp modSp">
-        <pc:chgData name="Marcia Moraes" userId="c9c67e8a-58e2-4733-9a1c-5d44fec4775b" providerId="ADAL" clId="{65A51C50-0255-4629-87C5-E90858C71A63}" dt="2023-02-26T18:03:29.922" v="248" actId="113"/>
+      <pc:sldChg chg="addSp modSp">
+        <pc:chgData name="Marcia Moraes" userId="c9c67e8a-58e2-4733-9a1c-5d44fec4775b" providerId="ADAL" clId="{E45C26DC-0BD9-4717-BFEB-54C307A378F6}" dt="2023-09-14T14:07:40.724" v="120" actId="1076"/>
         <pc:sldMkLst>
           <pc:docMk/>
           <pc:sldMk cId="926474781" sldId="266"/>
         </pc:sldMkLst>
-        <pc:spChg chg="add del mod">
-          <ac:chgData name="Marcia Moraes" userId="c9c67e8a-58e2-4733-9a1c-5d44fec4775b" providerId="ADAL" clId="{65A51C50-0255-4629-87C5-E90858C71A63}" dt="2023-02-26T17:58:44.355" v="97" actId="478"/>
-          <ac:spMkLst>
-            <pc:docMk/>
-            <pc:sldMk cId="926474781" sldId="266"/>
-            <ac:spMk id="3" creationId="{EB2A1A0D-F2F5-46D9-84C0-DF4A09018D2B}"/>
-          </ac:spMkLst>
-        </pc:spChg>
-        <pc:spChg chg="del mod">
-          <ac:chgData name="Marcia Moraes" userId="c9c67e8a-58e2-4733-9a1c-5d44fec4775b" providerId="ADAL" clId="{65A51C50-0255-4629-87C5-E90858C71A63}" dt="2023-02-26T17:58:41.199" v="95" actId="478"/>
-          <ac:spMkLst>
-            <pc:docMk/>
-            <pc:sldMk cId="926474781" sldId="266"/>
-            <ac:spMk id="5" creationId="{1BBD0DB5-379A-304F-9307-E7B1A89B08F7}"/>
-          </ac:spMkLst>
-        </pc:spChg>
-        <pc:spChg chg="add mod">
-          <ac:chgData name="Marcia Moraes" userId="c9c67e8a-58e2-4733-9a1c-5d44fec4775b" providerId="ADAL" clId="{65A51C50-0255-4629-87C5-E90858C71A63}" dt="2023-02-26T18:03:29.922" v="248" actId="113"/>
+        <pc:spChg chg="mod">
+          <ac:chgData name="Marcia Moraes" userId="c9c67e8a-58e2-4733-9a1c-5d44fec4775b" providerId="ADAL" clId="{E45C26DC-0BD9-4717-BFEB-54C307A378F6}" dt="2023-09-14T14:07:40.724" v="120" actId="1076"/>
           <ac:spMkLst>
             <pc:docMk/>
             <pc:sldMk cId="926474781" sldId="266"/>
             <ac:spMk id="6" creationId="{A2494937-C0C7-4ABC-A6FF-48F67C26DCCE}"/>
           </ac:spMkLst>
         </pc:spChg>
-        <pc:spChg chg="del">
-          <ac:chgData name="Marcia Moraes" userId="c9c67e8a-58e2-4733-9a1c-5d44fec4775b" providerId="ADAL" clId="{65A51C50-0255-4629-87C5-E90858C71A63}" dt="2023-02-26T17:50:53.979" v="64" actId="478"/>
+        <pc:spChg chg="add">
+          <ac:chgData name="Marcia Moraes" userId="c9c67e8a-58e2-4733-9a1c-5d44fec4775b" providerId="ADAL" clId="{E45C26DC-0BD9-4717-BFEB-54C307A378F6}" dt="2023-09-14T14:07:26.122" v="119"/>
           <ac:spMkLst>
             <pc:docMk/>
             <pc:sldMk cId="926474781" sldId="266"/>
-            <ac:spMk id="7" creationId="{BF16D510-BC74-4FA5-AFD2-193B039115A5}"/>
+            <ac:spMk id="8" creationId="{F5B6B779-DA8F-4634-9BE5-CEDBDC056F9A}"/>
           </ac:spMkLst>
         </pc:spChg>
-        <pc:spChg chg="del">
-          <ac:chgData name="Marcia Moraes" userId="c9c67e8a-58e2-4733-9a1c-5d44fec4775b" providerId="ADAL" clId="{65A51C50-0255-4629-87C5-E90858C71A63}" dt="2023-02-26T17:51:07.043" v="65" actId="478"/>
-          <ac:spMkLst>
-            <pc:docMk/>
-            <pc:sldMk cId="926474781" sldId="266"/>
-            <ac:spMk id="9" creationId="{AA545922-76CF-403E-BE13-D3B79F5D5FB9}"/>
-          </ac:spMkLst>
-        </pc:spChg>
-        <pc:spChg chg="add mod">
-          <ac:chgData name="Marcia Moraes" userId="c9c67e8a-58e2-4733-9a1c-5d44fec4775b" providerId="ADAL" clId="{65A51C50-0255-4629-87C5-E90858C71A63}" dt="2023-02-26T17:59:20.538" v="118" actId="20577"/>
+        <pc:spChg chg="mod">
+          <ac:chgData name="Marcia Moraes" userId="c9c67e8a-58e2-4733-9a1c-5d44fec4775b" providerId="ADAL" clId="{E45C26DC-0BD9-4717-BFEB-54C307A378F6}" dt="2023-09-14T14:04:57.757" v="117" actId="20577"/>
           <ac:spMkLst>
             <pc:docMk/>
             <pc:sldMk cId="926474781" sldId="266"/>
             <ac:spMk id="11" creationId="{BDA0DBC1-29A7-4498-B9AA-9B174D0FEC3E}"/>
           </ac:spMkLst>
         </pc:spChg>
-        <pc:picChg chg="add del mod">
-          <ac:chgData name="Marcia Moraes" userId="c9c67e8a-58e2-4733-9a1c-5d44fec4775b" providerId="ADAL" clId="{65A51C50-0255-4629-87C5-E90858C71A63}" dt="2023-02-26T17:55:43.788" v="68" actId="478"/>
-          <ac:picMkLst>
+        <pc:graphicFrameChg chg="add">
+          <ac:chgData name="Marcia Moraes" userId="c9c67e8a-58e2-4733-9a1c-5d44fec4775b" providerId="ADAL" clId="{E45C26DC-0BD9-4717-BFEB-54C307A378F6}" dt="2023-09-14T14:07:26.122" v="119"/>
+          <ac:graphicFrameMkLst>
             <pc:docMk/>
             <pc:sldMk cId="926474781" sldId="266"/>
-            <ac:picMk id="1026" creationId="{BB5DC187-EB5E-4FE5-881E-9DA24DBD3DB7}"/>
-          </ac:picMkLst>
-        </pc:picChg>
-        <pc:picChg chg="add del mod">
-          <ac:chgData name="Marcia Moraes" userId="c9c67e8a-58e2-4733-9a1c-5d44fec4775b" providerId="ADAL" clId="{65A51C50-0255-4629-87C5-E90858C71A63}" dt="2023-02-26T17:57:30.065" v="75" actId="478"/>
-          <ac:picMkLst>
-            <pc:docMk/>
-            <pc:sldMk cId="926474781" sldId="266"/>
-            <ac:picMk id="1028" creationId="{93E404CE-DAD1-4826-91D6-DB068EABE8B3}"/>
-          </ac:picMkLst>
-        </pc:picChg>
-        <pc:picChg chg="add mod">
-          <ac:chgData name="Marcia Moraes" userId="c9c67e8a-58e2-4733-9a1c-5d44fec4775b" providerId="ADAL" clId="{65A51C50-0255-4629-87C5-E90858C71A63}" dt="2023-02-26T17:57:37.177" v="78" actId="1076"/>
-          <ac:picMkLst>
-            <pc:docMk/>
-            <pc:sldMk cId="926474781" sldId="266"/>
-            <ac:picMk id="1030" creationId="{816C7A0A-336A-4062-8EE3-E6B475BB6366}"/>
-          </ac:picMkLst>
-        </pc:picChg>
-      </pc:sldChg>
-      <pc:sldChg chg="del">
-        <pc:chgData name="Marcia Moraes" userId="c9c67e8a-58e2-4733-9a1c-5d44fec4775b" providerId="ADAL" clId="{65A51C50-0255-4629-87C5-E90858C71A63}" dt="2023-02-26T21:06:47.095" v="1989" actId="2696"/>
-        <pc:sldMkLst>
-          <pc:docMk/>
-          <pc:sldMk cId="2467172699" sldId="267"/>
-        </pc:sldMkLst>
-      </pc:sldChg>
-      <pc:sldChg chg="del">
-        <pc:chgData name="Marcia Moraes" userId="c9c67e8a-58e2-4733-9a1c-5d44fec4775b" providerId="ADAL" clId="{65A51C50-0255-4629-87C5-E90858C71A63}" dt="2023-02-26T21:06:48.071" v="1990" actId="2696"/>
-        <pc:sldMkLst>
-          <pc:docMk/>
-          <pc:sldMk cId="1439851429" sldId="268"/>
-        </pc:sldMkLst>
-      </pc:sldChg>
-      <pc:sldChg chg="addSp modSp add modAnim">
-        <pc:chgData name="Marcia Moraes" userId="c9c67e8a-58e2-4733-9a1c-5d44fec4775b" providerId="ADAL" clId="{65A51C50-0255-4629-87C5-E90858C71A63}" dt="2023-02-26T20:42:32.970" v="1735" actId="20577"/>
-        <pc:sldMkLst>
-          <pc:docMk/>
-          <pc:sldMk cId="963998120" sldId="269"/>
-        </pc:sldMkLst>
-        <pc:spChg chg="add mod">
-          <ac:chgData name="Marcia Moraes" userId="c9c67e8a-58e2-4733-9a1c-5d44fec4775b" providerId="ADAL" clId="{65A51C50-0255-4629-87C5-E90858C71A63}" dt="2023-02-26T20:42:00.730" v="1700" actId="207"/>
-          <ac:spMkLst>
-            <pc:docMk/>
-            <pc:sldMk cId="963998120" sldId="269"/>
-            <ac:spMk id="2" creationId="{6A28D32C-599E-4C72-B960-03DA8129E513}"/>
-          </ac:spMkLst>
-        </pc:spChg>
-        <pc:spChg chg="mod">
-          <ac:chgData name="Marcia Moraes" userId="c9c67e8a-58e2-4733-9a1c-5d44fec4775b" providerId="ADAL" clId="{65A51C50-0255-4629-87C5-E90858C71A63}" dt="2023-02-26T20:42:20.032" v="1715" actId="20577"/>
-          <ac:spMkLst>
-            <pc:docMk/>
-            <pc:sldMk cId="963998120" sldId="269"/>
-            <ac:spMk id="4" creationId="{683FFEF0-EAC6-454C-9E58-568E0B3AD6FB}"/>
-          </ac:spMkLst>
-        </pc:spChg>
-        <pc:spChg chg="mod">
-          <ac:chgData name="Marcia Moraes" userId="c9c67e8a-58e2-4733-9a1c-5d44fec4775b" providerId="ADAL" clId="{65A51C50-0255-4629-87C5-E90858C71A63}" dt="2023-02-26T20:42:32.970" v="1735" actId="20577"/>
-          <ac:spMkLst>
-            <pc:docMk/>
-            <pc:sldMk cId="963998120" sldId="269"/>
-            <ac:spMk id="5" creationId="{B14CD88C-B718-634B-8318-80188AABD775}"/>
-          </ac:spMkLst>
-        </pc:spChg>
-      </pc:sldChg>
-      <pc:sldChg chg="delSp modSp add">
-        <pc:chgData name="Marcia Moraes" userId="c9c67e8a-58e2-4733-9a1c-5d44fec4775b" providerId="ADAL" clId="{65A51C50-0255-4629-87C5-E90858C71A63}" dt="2023-02-26T18:46:13.975" v="347" actId="20577"/>
-        <pc:sldMkLst>
-          <pc:docMk/>
-          <pc:sldMk cId="322390522" sldId="270"/>
-        </pc:sldMkLst>
-        <pc:spChg chg="del">
-          <ac:chgData name="Marcia Moraes" userId="c9c67e8a-58e2-4733-9a1c-5d44fec4775b" providerId="ADAL" clId="{65A51C50-0255-4629-87C5-E90858C71A63}" dt="2023-02-26T18:25:52.016" v="329" actId="478"/>
-          <ac:spMkLst>
-            <pc:docMk/>
-            <pc:sldMk cId="322390522" sldId="270"/>
-            <ac:spMk id="3" creationId="{85221225-9A6E-4169-BB19-EC833AAC9F1B}"/>
-          </ac:spMkLst>
-        </pc:spChg>
-        <pc:spChg chg="mod">
-          <ac:chgData name="Marcia Moraes" userId="c9c67e8a-58e2-4733-9a1c-5d44fec4775b" providerId="ADAL" clId="{65A51C50-0255-4629-87C5-E90858C71A63}" dt="2023-02-26T18:46:13.975" v="347" actId="20577"/>
-          <ac:spMkLst>
-            <pc:docMk/>
-            <pc:sldMk cId="322390522" sldId="270"/>
-            <ac:spMk id="4" creationId="{683FFEF0-EAC6-454C-9E58-568E0B3AD6FB}"/>
-          </ac:spMkLst>
-        </pc:spChg>
-        <pc:spChg chg="mod">
-          <ac:chgData name="Marcia Moraes" userId="c9c67e8a-58e2-4733-9a1c-5d44fec4775b" providerId="ADAL" clId="{65A51C50-0255-4629-87C5-E90858C71A63}" dt="2023-02-26T18:27:41.097" v="339" actId="108"/>
-          <ac:spMkLst>
-            <pc:docMk/>
-            <pc:sldMk cId="322390522" sldId="270"/>
-            <ac:spMk id="5" creationId="{B14CD88C-B718-634B-8318-80188AABD775}"/>
-          </ac:spMkLst>
-        </pc:spChg>
-        <pc:picChg chg="del">
-          <ac:chgData name="Marcia Moraes" userId="c9c67e8a-58e2-4733-9a1c-5d44fec4775b" providerId="ADAL" clId="{65A51C50-0255-4629-87C5-E90858C71A63}" dt="2023-02-26T18:25:50.452" v="328" actId="478"/>
-          <ac:picMkLst>
-            <pc:docMk/>
-            <pc:sldMk cId="322390522" sldId="270"/>
-            <ac:picMk id="2050" creationId="{C488E6A0-6A8E-444E-A637-56F113AA9BF0}"/>
-          </ac:picMkLst>
-        </pc:picChg>
-        <pc:picChg chg="del">
-          <ac:chgData name="Marcia Moraes" userId="c9c67e8a-58e2-4733-9a1c-5d44fec4775b" providerId="ADAL" clId="{65A51C50-0255-4629-87C5-E90858C71A63}" dt="2023-02-26T18:25:55.140" v="330" actId="478"/>
-          <ac:picMkLst>
-            <pc:docMk/>
-            <pc:sldMk cId="322390522" sldId="270"/>
-            <ac:picMk id="2054" creationId="{E78F3128-1391-4DF9-A51B-DC175E9ACD04}"/>
-          </ac:picMkLst>
-        </pc:picChg>
-      </pc:sldChg>
-      <pc:sldChg chg="addSp delSp modSp add">
-        <pc:chgData name="Marcia Moraes" userId="c9c67e8a-58e2-4733-9a1c-5d44fec4775b" providerId="ADAL" clId="{65A51C50-0255-4629-87C5-E90858C71A63}" dt="2023-02-26T19:01:00.991" v="808" actId="1076"/>
-        <pc:sldMkLst>
-          <pc:docMk/>
-          <pc:sldMk cId="2222719984" sldId="271"/>
-        </pc:sldMkLst>
-        <pc:spChg chg="add del">
-          <ac:chgData name="Marcia Moraes" userId="c9c67e8a-58e2-4733-9a1c-5d44fec4775b" providerId="ADAL" clId="{65A51C50-0255-4629-87C5-E90858C71A63}" dt="2023-02-26T18:48:52.714" v="354"/>
-          <ac:spMkLst>
-            <pc:docMk/>
-            <pc:sldMk cId="2222719984" sldId="271"/>
-            <ac:spMk id="2" creationId="{7C46AA0E-A3C8-4565-BE10-422693E6B1A5}"/>
-          </ac:spMkLst>
-        </pc:spChg>
-        <pc:spChg chg="add del">
-          <ac:chgData name="Marcia Moraes" userId="c9c67e8a-58e2-4733-9a1c-5d44fec4775b" providerId="ADAL" clId="{65A51C50-0255-4629-87C5-E90858C71A63}" dt="2023-02-26T18:48:52.377" v="353"/>
-          <ac:spMkLst>
-            <pc:docMk/>
-            <pc:sldMk cId="2222719984" sldId="271"/>
-            <ac:spMk id="3" creationId="{1DAA6530-FBFC-4B29-9701-97354E3AA1B9}"/>
-          </ac:spMkLst>
-        </pc:spChg>
-        <pc:spChg chg="mod">
-          <ac:chgData name="Marcia Moraes" userId="c9c67e8a-58e2-4733-9a1c-5d44fec4775b" providerId="ADAL" clId="{65A51C50-0255-4629-87C5-E90858C71A63}" dt="2023-02-26T19:00:59.154" v="807" actId="1076"/>
-          <ac:spMkLst>
-            <pc:docMk/>
-            <pc:sldMk cId="2222719984" sldId="271"/>
-            <ac:spMk id="4" creationId="{683FFEF0-EAC6-454C-9E58-568E0B3AD6FB}"/>
-          </ac:spMkLst>
-        </pc:spChg>
-        <pc:spChg chg="add del mod">
-          <ac:chgData name="Marcia Moraes" userId="c9c67e8a-58e2-4733-9a1c-5d44fec4775b" providerId="ADAL" clId="{65A51C50-0255-4629-87C5-E90858C71A63}" dt="2023-02-26T19:01:00.991" v="808" actId="1076"/>
-          <ac:spMkLst>
-            <pc:docMk/>
-            <pc:sldMk cId="2222719984" sldId="271"/>
-            <ac:spMk id="5" creationId="{B14CD88C-B718-634B-8318-80188AABD775}"/>
-          </ac:spMkLst>
-        </pc:spChg>
-        <pc:spChg chg="add del">
-          <ac:chgData name="Marcia Moraes" userId="c9c67e8a-58e2-4733-9a1c-5d44fec4775b" providerId="ADAL" clId="{65A51C50-0255-4629-87C5-E90858C71A63}" dt="2023-02-26T18:49:04.420" v="358" actId="478"/>
-          <ac:spMkLst>
-            <pc:docMk/>
-            <pc:sldMk cId="2222719984" sldId="271"/>
-            <ac:spMk id="6" creationId="{19CF9120-FF53-4B67-9180-ED956DB4CF21}"/>
-          </ac:spMkLst>
-        </pc:spChg>
-        <pc:spChg chg="add del mod">
-          <ac:chgData name="Marcia Moraes" userId="c9c67e8a-58e2-4733-9a1c-5d44fec4775b" providerId="ADAL" clId="{65A51C50-0255-4629-87C5-E90858C71A63}" dt="2023-02-26T18:48:59.329" v="357"/>
-          <ac:spMkLst>
-            <pc:docMk/>
-            <pc:sldMk cId="2222719984" sldId="271"/>
-            <ac:spMk id="7" creationId="{46CF9E93-CE03-4EBC-B951-1B0761424588}"/>
-          </ac:spMkLst>
-        </pc:spChg>
-        <pc:spChg chg="add mod">
-          <ac:chgData name="Marcia Moraes" userId="c9c67e8a-58e2-4733-9a1c-5d44fec4775b" providerId="ADAL" clId="{65A51C50-0255-4629-87C5-E90858C71A63}" dt="2023-02-26T18:49:43.747" v="364"/>
-          <ac:spMkLst>
-            <pc:docMk/>
-            <pc:sldMk cId="2222719984" sldId="271"/>
-            <ac:spMk id="8" creationId="{3C13FCA2-2A25-4444-B130-608B6200594A}"/>
-          </ac:spMkLst>
-        </pc:spChg>
-      </pc:sldChg>
-      <pc:sldChg chg="addSp modSp add ord">
-        <pc:chgData name="Marcia Moraes" userId="c9c67e8a-58e2-4733-9a1c-5d44fec4775b" providerId="ADAL" clId="{65A51C50-0255-4629-87C5-E90858C71A63}" dt="2023-02-26T20:36:14.766" v="1511" actId="20577"/>
-        <pc:sldMkLst>
-          <pc:docMk/>
-          <pc:sldMk cId="617333236" sldId="272"/>
-        </pc:sldMkLst>
-        <pc:spChg chg="add mod">
-          <ac:chgData name="Marcia Moraes" userId="c9c67e8a-58e2-4733-9a1c-5d44fec4775b" providerId="ADAL" clId="{65A51C50-0255-4629-87C5-E90858C71A63}" dt="2023-02-26T19:28:01.538" v="1032" actId="20577"/>
-          <ac:spMkLst>
-            <pc:docMk/>
-            <pc:sldMk cId="617333236" sldId="272"/>
-            <ac:spMk id="2" creationId="{7F728A50-3AC9-458C-84CF-9374D3AD826A}"/>
-          </ac:spMkLst>
-        </pc:spChg>
-        <pc:spChg chg="mod">
-          <ac:chgData name="Marcia Moraes" userId="c9c67e8a-58e2-4733-9a1c-5d44fec4775b" providerId="ADAL" clId="{65A51C50-0255-4629-87C5-E90858C71A63}" dt="2023-02-26T20:36:14.766" v="1511" actId="20577"/>
-          <ac:spMkLst>
-            <pc:docMk/>
-            <pc:sldMk cId="617333236" sldId="272"/>
-            <ac:spMk id="4" creationId="{683FFEF0-EAC6-454C-9E58-568E0B3AD6FB}"/>
-          </ac:spMkLst>
-        </pc:spChg>
-        <pc:spChg chg="mod">
-          <ac:chgData name="Marcia Moraes" userId="c9c67e8a-58e2-4733-9a1c-5d44fec4775b" providerId="ADAL" clId="{65A51C50-0255-4629-87C5-E90858C71A63}" dt="2023-02-26T19:27:52.546" v="1029" actId="1076"/>
-          <ac:spMkLst>
-            <pc:docMk/>
-            <pc:sldMk cId="617333236" sldId="272"/>
-            <ac:spMk id="5" creationId="{B14CD88C-B718-634B-8318-80188AABD775}"/>
-          </ac:spMkLst>
-        </pc:spChg>
-      </pc:sldChg>
-      <pc:sldChg chg="addSp delSp modSp add">
-        <pc:chgData name="Marcia Moraes" userId="c9c67e8a-58e2-4733-9a1c-5d44fec4775b" providerId="ADAL" clId="{65A51C50-0255-4629-87C5-E90858C71A63}" dt="2023-02-26T20:36:30.195" v="1536" actId="20577"/>
-        <pc:sldMkLst>
-          <pc:docMk/>
-          <pc:sldMk cId="4061113293" sldId="273"/>
-        </pc:sldMkLst>
-        <pc:spChg chg="mod">
-          <ac:chgData name="Marcia Moraes" userId="c9c67e8a-58e2-4733-9a1c-5d44fec4775b" providerId="ADAL" clId="{65A51C50-0255-4629-87C5-E90858C71A63}" dt="2023-02-26T19:28:31.695" v="1035" actId="1076"/>
-          <ac:spMkLst>
-            <pc:docMk/>
-            <pc:sldMk cId="4061113293" sldId="273"/>
-            <ac:spMk id="2" creationId="{7F728A50-3AC9-458C-84CF-9374D3AD826A}"/>
-          </ac:spMkLst>
-        </pc:spChg>
-        <pc:spChg chg="mod">
-          <ac:chgData name="Marcia Moraes" userId="c9c67e8a-58e2-4733-9a1c-5d44fec4775b" providerId="ADAL" clId="{65A51C50-0255-4629-87C5-E90858C71A63}" dt="2023-02-26T20:36:30.195" v="1536" actId="20577"/>
-          <ac:spMkLst>
-            <pc:docMk/>
-            <pc:sldMk cId="4061113293" sldId="273"/>
-            <ac:spMk id="4" creationId="{683FFEF0-EAC6-454C-9E58-568E0B3AD6FB}"/>
-          </ac:spMkLst>
-        </pc:spChg>
-        <pc:spChg chg="del">
-          <ac:chgData name="Marcia Moraes" userId="c9c67e8a-58e2-4733-9a1c-5d44fec4775b" providerId="ADAL" clId="{65A51C50-0255-4629-87C5-E90858C71A63}" dt="2023-02-26T19:28:22.922" v="1033" actId="478"/>
-          <ac:spMkLst>
-            <pc:docMk/>
-            <pc:sldMk cId="4061113293" sldId="273"/>
-            <ac:spMk id="5" creationId="{B14CD88C-B718-634B-8318-80188AABD775}"/>
-          </ac:spMkLst>
-        </pc:spChg>
-        <pc:spChg chg="add del mod">
-          <ac:chgData name="Marcia Moraes" userId="c9c67e8a-58e2-4733-9a1c-5d44fec4775b" providerId="ADAL" clId="{65A51C50-0255-4629-87C5-E90858C71A63}" dt="2023-02-26T19:28:24.377" v="1034" actId="478"/>
-          <ac:spMkLst>
-            <pc:docMk/>
-            <pc:sldMk cId="4061113293" sldId="273"/>
-            <ac:spMk id="6" creationId="{CB57634E-A019-4ADD-ABDD-3F9B7636AA8D}"/>
-          </ac:spMkLst>
-        </pc:spChg>
-        <pc:spChg chg="add mod">
-          <ac:chgData name="Marcia Moraes" userId="c9c67e8a-58e2-4733-9a1c-5d44fec4775b" providerId="ADAL" clId="{65A51C50-0255-4629-87C5-E90858C71A63}" dt="2023-02-26T19:30:14.144" v="1121" actId="207"/>
-          <ac:spMkLst>
-            <pc:docMk/>
-            <pc:sldMk cId="4061113293" sldId="273"/>
-            <ac:spMk id="7" creationId="{F6CDAF0B-069C-4FB5-ABD7-FA2D3DD25E45}"/>
-          </ac:spMkLst>
-        </pc:spChg>
-        <pc:spChg chg="add mod">
-          <ac:chgData name="Marcia Moraes" userId="c9c67e8a-58e2-4733-9a1c-5d44fec4775b" providerId="ADAL" clId="{65A51C50-0255-4629-87C5-E90858C71A63}" dt="2023-02-26T19:30:59.523" v="1131" actId="20577"/>
-          <ac:spMkLst>
-            <pc:docMk/>
-            <pc:sldMk cId="4061113293" sldId="273"/>
-            <ac:spMk id="8" creationId="{D019F65B-EC0B-42B1-B413-6AFB92A5F3BD}"/>
-          </ac:spMkLst>
-        </pc:spChg>
-        <pc:spChg chg="add mod">
-          <ac:chgData name="Marcia Moraes" userId="c9c67e8a-58e2-4733-9a1c-5d44fec4775b" providerId="ADAL" clId="{65A51C50-0255-4629-87C5-E90858C71A63}" dt="2023-02-26T19:32:08.316" v="1231" actId="20577"/>
-          <ac:spMkLst>
-            <pc:docMk/>
-            <pc:sldMk cId="4061113293" sldId="273"/>
-            <ac:spMk id="9" creationId="{63A11248-584D-4E06-98C4-A69DB3A528B5}"/>
-          </ac:spMkLst>
-        </pc:spChg>
-      </pc:sldChg>
-      <pc:sldChg chg="addSp delSp modSp add modAnim">
-        <pc:chgData name="Marcia Moraes" userId="c9c67e8a-58e2-4733-9a1c-5d44fec4775b" providerId="ADAL" clId="{65A51C50-0255-4629-87C5-E90858C71A63}" dt="2023-02-26T19:35:59.369" v="1261"/>
-        <pc:sldMkLst>
-          <pc:docMk/>
-          <pc:sldMk cId="1960556700" sldId="274"/>
-        </pc:sldMkLst>
-        <pc:spChg chg="add mod">
-          <ac:chgData name="Marcia Moraes" userId="c9c67e8a-58e2-4733-9a1c-5d44fec4775b" providerId="ADAL" clId="{65A51C50-0255-4629-87C5-E90858C71A63}" dt="2023-02-26T19:35:56.002" v="1260" actId="207"/>
-          <ac:spMkLst>
-            <pc:docMk/>
-            <pc:sldMk cId="1960556700" sldId="274"/>
-            <ac:spMk id="3" creationId="{CEA66ED5-95CE-41E8-B149-999A647F5EEA}"/>
-          </ac:spMkLst>
-        </pc:spChg>
-        <pc:spChg chg="mod">
-          <ac:chgData name="Marcia Moraes" userId="c9c67e8a-58e2-4733-9a1c-5d44fec4775b" providerId="ADAL" clId="{65A51C50-0255-4629-87C5-E90858C71A63}" dt="2023-02-26T19:34:04.682" v="1252" actId="20577"/>
-          <ac:spMkLst>
-            <pc:docMk/>
-            <pc:sldMk cId="1960556700" sldId="274"/>
-            <ac:spMk id="4" creationId="{683FFEF0-EAC6-454C-9E58-568E0B3AD6FB}"/>
-          </ac:spMkLst>
-        </pc:spChg>
-        <pc:spChg chg="del">
-          <ac:chgData name="Marcia Moraes" userId="c9c67e8a-58e2-4733-9a1c-5d44fec4775b" providerId="ADAL" clId="{65A51C50-0255-4629-87C5-E90858C71A63}" dt="2023-02-26T19:34:07.684" v="1253" actId="478"/>
-          <ac:spMkLst>
-            <pc:docMk/>
-            <pc:sldMk cId="1960556700" sldId="274"/>
-            <ac:spMk id="7" creationId="{F6CDAF0B-069C-4FB5-ABD7-FA2D3DD25E45}"/>
-          </ac:spMkLst>
-        </pc:spChg>
-        <pc:spChg chg="del">
-          <ac:chgData name="Marcia Moraes" userId="c9c67e8a-58e2-4733-9a1c-5d44fec4775b" providerId="ADAL" clId="{65A51C50-0255-4629-87C5-E90858C71A63}" dt="2023-02-26T19:34:08.923" v="1254" actId="478"/>
-          <ac:spMkLst>
-            <pc:docMk/>
-            <pc:sldMk cId="1960556700" sldId="274"/>
-            <ac:spMk id="8" creationId="{D019F65B-EC0B-42B1-B413-6AFB92A5F3BD}"/>
-          </ac:spMkLst>
-        </pc:spChg>
-        <pc:spChg chg="del">
-          <ac:chgData name="Marcia Moraes" userId="c9c67e8a-58e2-4733-9a1c-5d44fec4775b" providerId="ADAL" clId="{65A51C50-0255-4629-87C5-E90858C71A63}" dt="2023-02-26T19:34:11.097" v="1255" actId="478"/>
-          <ac:spMkLst>
-            <pc:docMk/>
-            <pc:sldMk cId="1960556700" sldId="274"/>
-            <ac:spMk id="9" creationId="{63A11248-584D-4E06-98C4-A69DB3A528B5}"/>
-          </ac:spMkLst>
-        </pc:spChg>
-      </pc:sldChg>
-      <pc:sldChg chg="addSp delSp modSp add ord">
-        <pc:chgData name="Marcia Moraes" userId="c9c67e8a-58e2-4733-9a1c-5d44fec4775b" providerId="ADAL" clId="{65A51C50-0255-4629-87C5-E90858C71A63}" dt="2023-02-26T20:36:37.395" v="1537"/>
-        <pc:sldMkLst>
-          <pc:docMk/>
-          <pc:sldMk cId="2030495812" sldId="275"/>
-        </pc:sldMkLst>
-        <pc:spChg chg="del">
-          <ac:chgData name="Marcia Moraes" userId="c9c67e8a-58e2-4733-9a1c-5d44fec4775b" providerId="ADAL" clId="{65A51C50-0255-4629-87C5-E90858C71A63}" dt="2023-02-26T19:39:08.338" v="1264" actId="478"/>
-          <ac:spMkLst>
-            <pc:docMk/>
-            <pc:sldMk cId="2030495812" sldId="275"/>
-            <ac:spMk id="2" creationId="{7F728A50-3AC9-458C-84CF-9374D3AD826A}"/>
-          </ac:spMkLst>
-        </pc:spChg>
-        <pc:spChg chg="add del mod">
-          <ac:chgData name="Marcia Moraes" userId="c9c67e8a-58e2-4733-9a1c-5d44fec4775b" providerId="ADAL" clId="{65A51C50-0255-4629-87C5-E90858C71A63}" dt="2023-02-26T19:43:43.122" v="1284" actId="478"/>
-          <ac:spMkLst>
-            <pc:docMk/>
-            <pc:sldMk cId="2030495812" sldId="275"/>
-            <ac:spMk id="3" creationId="{99FC0FE6-0C19-4651-A211-4A7B389695D7}"/>
-          </ac:spMkLst>
-        </pc:spChg>
-        <pc:spChg chg="mod">
-          <ac:chgData name="Marcia Moraes" userId="c9c67e8a-58e2-4733-9a1c-5d44fec4775b" providerId="ADAL" clId="{65A51C50-0255-4629-87C5-E90858C71A63}" dt="2023-02-26T20:36:37.395" v="1537"/>
-          <ac:spMkLst>
-            <pc:docMk/>
-            <pc:sldMk cId="2030495812" sldId="275"/>
-            <ac:spMk id="4" creationId="{683FFEF0-EAC6-454C-9E58-568E0B3AD6FB}"/>
-          </ac:spMkLst>
-        </pc:spChg>
-        <pc:spChg chg="add del">
-          <ac:chgData name="Marcia Moraes" userId="c9c67e8a-58e2-4733-9a1c-5d44fec4775b" providerId="ADAL" clId="{65A51C50-0255-4629-87C5-E90858C71A63}" dt="2023-02-26T19:43:43.122" v="1284" actId="478"/>
-          <ac:spMkLst>
-            <pc:docMk/>
-            <pc:sldMk cId="2030495812" sldId="275"/>
-            <ac:spMk id="5" creationId="{DA42ADD7-CC42-49FA-A888-18417A756E4A}"/>
-          </ac:spMkLst>
-        </pc:spChg>
-        <pc:spChg chg="add mod">
-          <ac:chgData name="Marcia Moraes" userId="c9c67e8a-58e2-4733-9a1c-5d44fec4775b" providerId="ADAL" clId="{65A51C50-0255-4629-87C5-E90858C71A63}" dt="2023-02-26T19:43:59.004" v="1290" actId="14100"/>
-          <ac:spMkLst>
-            <pc:docMk/>
-            <pc:sldMk cId="2030495812" sldId="275"/>
-            <ac:spMk id="6" creationId="{81A653D7-0DEA-4DBC-9FD7-E44D47B6CB9F}"/>
-          </ac:spMkLst>
-        </pc:spChg>
-        <pc:spChg chg="mod">
-          <ac:chgData name="Marcia Moraes" userId="c9c67e8a-58e2-4733-9a1c-5d44fec4775b" providerId="ADAL" clId="{65A51C50-0255-4629-87C5-E90858C71A63}" dt="2023-02-26T19:40:07.374" v="1275" actId="1076"/>
-          <ac:spMkLst>
-            <pc:docMk/>
-            <pc:sldMk cId="2030495812" sldId="275"/>
-            <ac:spMk id="7" creationId="{F6CDAF0B-069C-4FB5-ABD7-FA2D3DD25E45}"/>
-          </ac:spMkLst>
-        </pc:spChg>
-        <pc:spChg chg="mod">
-          <ac:chgData name="Marcia Moraes" userId="c9c67e8a-58e2-4733-9a1c-5d44fec4775b" providerId="ADAL" clId="{65A51C50-0255-4629-87C5-E90858C71A63}" dt="2023-02-26T19:42:01.833" v="1282" actId="20577"/>
-          <ac:spMkLst>
-            <pc:docMk/>
-            <pc:sldMk cId="2030495812" sldId="275"/>
-            <ac:spMk id="8" creationId="{D019F65B-EC0B-42B1-B413-6AFB92A5F3BD}"/>
-          </ac:spMkLst>
-        </pc:spChg>
-        <pc:spChg chg="del">
-          <ac:chgData name="Marcia Moraes" userId="c9c67e8a-58e2-4733-9a1c-5d44fec4775b" providerId="ADAL" clId="{65A51C50-0255-4629-87C5-E90858C71A63}" dt="2023-02-26T19:40:00.801" v="1272" actId="478"/>
-          <ac:spMkLst>
-            <pc:docMk/>
-            <pc:sldMk cId="2030495812" sldId="275"/>
-            <ac:spMk id="9" creationId="{63A11248-584D-4E06-98C4-A69DB3A528B5}"/>
-          </ac:spMkLst>
-        </pc:spChg>
-      </pc:sldChg>
-      <pc:sldChg chg="delSp modSp add modAnim">
-        <pc:chgData name="Marcia Moraes" userId="c9c67e8a-58e2-4733-9a1c-5d44fec4775b" providerId="ADAL" clId="{65A51C50-0255-4629-87C5-E90858C71A63}" dt="2023-02-26T19:45:21.168" v="1318"/>
-        <pc:sldMkLst>
-          <pc:docMk/>
-          <pc:sldMk cId="3925781527" sldId="276"/>
-        </pc:sldMkLst>
-        <pc:spChg chg="mod">
-          <ac:chgData name="Marcia Moraes" userId="c9c67e8a-58e2-4733-9a1c-5d44fec4775b" providerId="ADAL" clId="{65A51C50-0255-4629-87C5-E90858C71A63}" dt="2023-02-26T19:44:48.452" v="1314"/>
-          <ac:spMkLst>
-            <pc:docMk/>
-            <pc:sldMk cId="3925781527" sldId="276"/>
-            <ac:spMk id="4" creationId="{683FFEF0-EAC6-454C-9E58-568E0B3AD6FB}"/>
-          </ac:spMkLst>
-        </pc:spChg>
-        <pc:spChg chg="del">
-          <ac:chgData name="Marcia Moraes" userId="c9c67e8a-58e2-4733-9a1c-5d44fec4775b" providerId="ADAL" clId="{65A51C50-0255-4629-87C5-E90858C71A63}" dt="2023-02-26T19:44:58.257" v="1315" actId="478"/>
-          <ac:spMkLst>
-            <pc:docMk/>
-            <pc:sldMk cId="3925781527" sldId="276"/>
-            <ac:spMk id="7" creationId="{F6CDAF0B-069C-4FB5-ABD7-FA2D3DD25E45}"/>
-          </ac:spMkLst>
-        </pc:spChg>
-        <pc:spChg chg="mod">
-          <ac:chgData name="Marcia Moraes" userId="c9c67e8a-58e2-4733-9a1c-5d44fec4775b" providerId="ADAL" clId="{65A51C50-0255-4629-87C5-E90858C71A63}" dt="2023-02-26T19:45:18.022" v="1317" actId="1076"/>
-          <ac:spMkLst>
-            <pc:docMk/>
-            <pc:sldMk cId="3925781527" sldId="276"/>
-            <ac:spMk id="8" creationId="{D019F65B-EC0B-42B1-B413-6AFB92A5F3BD}"/>
-          </ac:spMkLst>
-        </pc:spChg>
-      </pc:sldChg>
-      <pc:sldChg chg="addSp delSp modSp add ord delAnim modAnim">
-        <pc:chgData name="Marcia Moraes" userId="c9c67e8a-58e2-4733-9a1c-5d44fec4775b" providerId="ADAL" clId="{65A51C50-0255-4629-87C5-E90858C71A63}" dt="2023-02-26T21:38:11.217" v="2149"/>
-        <pc:sldMkLst>
-          <pc:docMk/>
-          <pc:sldMk cId="249454639" sldId="277"/>
-        </pc:sldMkLst>
-        <pc:spChg chg="add mod">
-          <ac:chgData name="Marcia Moraes" userId="c9c67e8a-58e2-4733-9a1c-5d44fec4775b" providerId="ADAL" clId="{65A51C50-0255-4629-87C5-E90858C71A63}" dt="2023-02-26T19:48:39.648" v="1327" actId="14100"/>
-          <ac:spMkLst>
-            <pc:docMk/>
-            <pc:sldMk cId="249454639" sldId="277"/>
-            <ac:spMk id="2" creationId="{BFDDDFDE-F893-47DD-BF44-9F0937D468FA}"/>
-          </ac:spMkLst>
-        </pc:spChg>
-        <pc:spChg chg="add del">
-          <ac:chgData name="Marcia Moraes" userId="c9c67e8a-58e2-4733-9a1c-5d44fec4775b" providerId="ADAL" clId="{65A51C50-0255-4629-87C5-E90858C71A63}" dt="2023-02-26T19:49:17.795" v="1351"/>
-          <ac:spMkLst>
-            <pc:docMk/>
-            <pc:sldMk cId="249454639" sldId="277"/>
-            <ac:spMk id="3" creationId="{2079D0CD-9FDB-4EC1-B880-BD351826D3EA}"/>
-          </ac:spMkLst>
-        </pc:spChg>
-        <pc:spChg chg="mod">
-          <ac:chgData name="Marcia Moraes" userId="c9c67e8a-58e2-4733-9a1c-5d44fec4775b" providerId="ADAL" clId="{65A51C50-0255-4629-87C5-E90858C71A63}" dt="2023-02-26T20:36:46.503" v="1538"/>
-          <ac:spMkLst>
-            <pc:docMk/>
-            <pc:sldMk cId="249454639" sldId="277"/>
-            <ac:spMk id="4" creationId="{683FFEF0-EAC6-454C-9E58-568E0B3AD6FB}"/>
-          </ac:spMkLst>
-        </pc:spChg>
-        <pc:spChg chg="add mod">
-          <ac:chgData name="Marcia Moraes" userId="c9c67e8a-58e2-4733-9a1c-5d44fec4775b" providerId="ADAL" clId="{65A51C50-0255-4629-87C5-E90858C71A63}" dt="2023-02-26T19:51:53.148" v="1393" actId="207"/>
-          <ac:spMkLst>
-            <pc:docMk/>
-            <pc:sldMk cId="249454639" sldId="277"/>
-            <ac:spMk id="5" creationId="{AA461FA5-A736-4CB1-94B4-59092EFD1D09}"/>
-          </ac:spMkLst>
-        </pc:spChg>
-        <pc:spChg chg="del">
-          <ac:chgData name="Marcia Moraes" userId="c9c67e8a-58e2-4733-9a1c-5d44fec4775b" providerId="ADAL" clId="{65A51C50-0255-4629-87C5-E90858C71A63}" dt="2023-02-26T19:48:24.674" v="1321" actId="478"/>
-          <ac:spMkLst>
-            <pc:docMk/>
-            <pc:sldMk cId="249454639" sldId="277"/>
-            <ac:spMk id="6" creationId="{81A653D7-0DEA-4DBC-9FD7-E44D47B6CB9F}"/>
-          </ac:spMkLst>
-        </pc:spChg>
-        <pc:spChg chg="mod">
-          <ac:chgData name="Marcia Moraes" userId="c9c67e8a-58e2-4733-9a1c-5d44fec4775b" providerId="ADAL" clId="{65A51C50-0255-4629-87C5-E90858C71A63}" dt="2023-02-26T19:49:44.333" v="1361" actId="1076"/>
-          <ac:spMkLst>
-            <pc:docMk/>
-            <pc:sldMk cId="249454639" sldId="277"/>
-            <ac:spMk id="7" creationId="{F6CDAF0B-069C-4FB5-ABD7-FA2D3DD25E45}"/>
-          </ac:spMkLst>
-        </pc:spChg>
-        <pc:spChg chg="del">
-          <ac:chgData name="Marcia Moraes" userId="c9c67e8a-58e2-4733-9a1c-5d44fec4775b" providerId="ADAL" clId="{65A51C50-0255-4629-87C5-E90858C71A63}" dt="2023-02-26T19:49:34.976" v="1360" actId="478"/>
-          <ac:spMkLst>
-            <pc:docMk/>
-            <pc:sldMk cId="249454639" sldId="277"/>
-            <ac:spMk id="8" creationId="{D019F65B-EC0B-42B1-B413-6AFB92A5F3BD}"/>
-          </ac:spMkLst>
-        </pc:spChg>
-        <pc:picChg chg="add del mod">
-          <ac:chgData name="Marcia Moraes" userId="c9c67e8a-58e2-4733-9a1c-5d44fec4775b" providerId="ADAL" clId="{65A51C50-0255-4629-87C5-E90858C71A63}" dt="2023-02-26T19:53:24.468" v="1396" actId="478"/>
-          <ac:picMkLst>
-            <pc:docMk/>
-            <pc:sldMk cId="249454639" sldId="277"/>
-            <ac:picMk id="9" creationId="{5D9482AD-4967-493A-8AAB-D4A24CD564F4}"/>
-          </ac:picMkLst>
-        </pc:picChg>
-        <pc:picChg chg="add mod">
-          <ac:chgData name="Marcia Moraes" userId="c9c67e8a-58e2-4733-9a1c-5d44fec4775b" providerId="ADAL" clId="{65A51C50-0255-4629-87C5-E90858C71A63}" dt="2023-02-26T19:53:34.678" v="1400" actId="692"/>
-          <ac:picMkLst>
-            <pc:docMk/>
-            <pc:sldMk cId="249454639" sldId="277"/>
-            <ac:picMk id="10" creationId="{E924ED09-ECE8-45CC-BD17-A155454C1045}"/>
-          </ac:picMkLst>
-        </pc:picChg>
-      </pc:sldChg>
-      <pc:sldChg chg="addSp delSp modSp add delAnim modAnim">
-        <pc:chgData name="Marcia Moraes" userId="c9c67e8a-58e2-4733-9a1c-5d44fec4775b" providerId="ADAL" clId="{65A51C50-0255-4629-87C5-E90858C71A63}" dt="2023-02-26T20:33:30.326" v="1463"/>
-        <pc:sldMkLst>
-          <pc:docMk/>
-          <pc:sldMk cId="1493962007" sldId="278"/>
-        </pc:sldMkLst>
-        <pc:spChg chg="del">
-          <ac:chgData name="Marcia Moraes" userId="c9c67e8a-58e2-4733-9a1c-5d44fec4775b" providerId="ADAL" clId="{65A51C50-0255-4629-87C5-E90858C71A63}" dt="2023-02-26T20:31:26.159" v="1403" actId="478"/>
-          <ac:spMkLst>
-            <pc:docMk/>
-            <pc:sldMk cId="1493962007" sldId="278"/>
-            <ac:spMk id="2" creationId="{BFDDDFDE-F893-47DD-BF44-9F0937D468FA}"/>
-          </ac:spMkLst>
-        </pc:spChg>
-        <pc:spChg chg="add del mod">
-          <ac:chgData name="Marcia Moraes" userId="c9c67e8a-58e2-4733-9a1c-5d44fec4775b" providerId="ADAL" clId="{65A51C50-0255-4629-87C5-E90858C71A63}" dt="2023-02-26T20:32:51.536" v="1454" actId="478"/>
-          <ac:spMkLst>
-            <pc:docMk/>
-            <pc:sldMk cId="1493962007" sldId="278"/>
-            <ac:spMk id="3" creationId="{F4905918-4689-4467-803F-836D3B09CD47}"/>
-          </ac:spMkLst>
-        </pc:spChg>
-        <pc:spChg chg="mod">
-          <ac:chgData name="Marcia Moraes" userId="c9c67e8a-58e2-4733-9a1c-5d44fec4775b" providerId="ADAL" clId="{65A51C50-0255-4629-87C5-E90858C71A63}" dt="2023-02-26T20:32:03.712" v="1452" actId="20577"/>
-          <ac:spMkLst>
-            <pc:docMk/>
-            <pc:sldMk cId="1493962007" sldId="278"/>
-            <ac:spMk id="4" creationId="{683FFEF0-EAC6-454C-9E58-568E0B3AD6FB}"/>
-          </ac:spMkLst>
-        </pc:spChg>
-        <pc:spChg chg="del">
-          <ac:chgData name="Marcia Moraes" userId="c9c67e8a-58e2-4733-9a1c-5d44fec4775b" providerId="ADAL" clId="{65A51C50-0255-4629-87C5-E90858C71A63}" dt="2023-02-26T20:31:42.731" v="1409" actId="478"/>
-          <ac:spMkLst>
-            <pc:docMk/>
-            <pc:sldMk cId="1493962007" sldId="278"/>
-            <ac:spMk id="5" creationId="{AA461FA5-A736-4CB1-94B4-59092EFD1D09}"/>
-          </ac:spMkLst>
-        </pc:spChg>
-        <pc:spChg chg="add mod">
-          <ac:chgData name="Marcia Moraes" userId="c9c67e8a-58e2-4733-9a1c-5d44fec4775b" providerId="ADAL" clId="{65A51C50-0255-4629-87C5-E90858C71A63}" dt="2023-02-26T20:33:06.240" v="1460" actId="207"/>
-          <ac:spMkLst>
-            <pc:docMk/>
-            <pc:sldMk cId="1493962007" sldId="278"/>
-            <ac:spMk id="6" creationId="{EAC16328-108B-4051-914B-28D9BC06D117}"/>
-          </ac:spMkLst>
-        </pc:spChg>
-        <pc:spChg chg="del">
-          <ac:chgData name="Marcia Moraes" userId="c9c67e8a-58e2-4733-9a1c-5d44fec4775b" providerId="ADAL" clId="{65A51C50-0255-4629-87C5-E90858C71A63}" dt="2023-02-26T20:31:23.099" v="1402" actId="478"/>
-          <ac:spMkLst>
-            <pc:docMk/>
-            <pc:sldMk cId="1493962007" sldId="278"/>
-            <ac:spMk id="7" creationId="{F6CDAF0B-069C-4FB5-ABD7-FA2D3DD25E45}"/>
-          </ac:spMkLst>
-        </pc:spChg>
-        <pc:picChg chg="add mod">
-          <ac:chgData name="Marcia Moraes" userId="c9c67e8a-58e2-4733-9a1c-5d44fec4775b" providerId="ADAL" clId="{65A51C50-0255-4629-87C5-E90858C71A63}" dt="2023-02-26T20:33:27.174" v="1462" actId="1076"/>
-          <ac:picMkLst>
-            <pc:docMk/>
-            <pc:sldMk cId="1493962007" sldId="278"/>
-            <ac:picMk id="8" creationId="{3CD92332-AA6D-42AC-A0E5-EC79ECC0EA72}"/>
-          </ac:picMkLst>
-        </pc:picChg>
-        <pc:picChg chg="del">
-          <ac:chgData name="Marcia Moraes" userId="c9c67e8a-58e2-4733-9a1c-5d44fec4775b" providerId="ADAL" clId="{65A51C50-0255-4629-87C5-E90858C71A63}" dt="2023-02-26T20:31:44.216" v="1410" actId="478"/>
-          <ac:picMkLst>
-            <pc:docMk/>
-            <pc:sldMk cId="1493962007" sldId="278"/>
-            <ac:picMk id="10" creationId="{E924ED09-ECE8-45CC-BD17-A155454C1045}"/>
-          </ac:picMkLst>
-        </pc:picChg>
-      </pc:sldChg>
-      <pc:sldChg chg="addSp delSp modSp add delAnim modAnim">
-        <pc:chgData name="Marcia Moraes" userId="c9c67e8a-58e2-4733-9a1c-5d44fec4775b" providerId="ADAL" clId="{65A51C50-0255-4629-87C5-E90858C71A63}" dt="2023-02-26T21:02:28.130" v="1939" actId="14100"/>
-        <pc:sldMkLst>
-          <pc:docMk/>
-          <pc:sldMk cId="1650964394" sldId="279"/>
-        </pc:sldMkLst>
-        <pc:spChg chg="del">
-          <ac:chgData name="Marcia Moraes" userId="c9c67e8a-58e2-4733-9a1c-5d44fec4775b" providerId="ADAL" clId="{65A51C50-0255-4629-87C5-E90858C71A63}" dt="2023-02-26T20:43:31.831" v="1756" actId="478"/>
-          <ac:spMkLst>
-            <pc:docMk/>
-            <pc:sldMk cId="1650964394" sldId="279"/>
-            <ac:spMk id="2" creationId="{6A28D32C-599E-4C72-B960-03DA8129E513}"/>
-          </ac:spMkLst>
-        </pc:spChg>
-        <pc:spChg chg="mod">
-          <ac:chgData name="Marcia Moraes" userId="c9c67e8a-58e2-4733-9a1c-5d44fec4775b" providerId="ADAL" clId="{65A51C50-0255-4629-87C5-E90858C71A63}" dt="2023-02-26T20:56:06.801" v="1804" actId="1076"/>
-          <ac:spMkLst>
-            <pc:docMk/>
-            <pc:sldMk cId="1650964394" sldId="279"/>
-            <ac:spMk id="4" creationId="{683FFEF0-EAC6-454C-9E58-568E0B3AD6FB}"/>
-          </ac:spMkLst>
-        </pc:spChg>
-        <pc:spChg chg="del">
-          <ac:chgData name="Marcia Moraes" userId="c9c67e8a-58e2-4733-9a1c-5d44fec4775b" providerId="ADAL" clId="{65A51C50-0255-4629-87C5-E90858C71A63}" dt="2023-02-26T20:54:48.716" v="1757" actId="478"/>
-          <ac:spMkLst>
-            <pc:docMk/>
-            <pc:sldMk cId="1650964394" sldId="279"/>
-            <ac:spMk id="5" creationId="{B14CD88C-B718-634B-8318-80188AABD775}"/>
-          </ac:spMkLst>
-        </pc:spChg>
-        <pc:spChg chg="add del mod">
-          <ac:chgData name="Marcia Moraes" userId="c9c67e8a-58e2-4733-9a1c-5d44fec4775b" providerId="ADAL" clId="{65A51C50-0255-4629-87C5-E90858C71A63}" dt="2023-02-26T20:55:22.960" v="1764" actId="478"/>
-          <ac:spMkLst>
-            <pc:docMk/>
-            <pc:sldMk cId="1650964394" sldId="279"/>
-            <ac:spMk id="6" creationId="{5A2E9376-21B6-490C-8E4B-41896518E5AB}"/>
-          </ac:spMkLst>
-        </pc:spChg>
-        <pc:spChg chg="add mod">
-          <ac:chgData name="Marcia Moraes" userId="c9c67e8a-58e2-4733-9a1c-5d44fec4775b" providerId="ADAL" clId="{65A51C50-0255-4629-87C5-E90858C71A63}" dt="2023-02-26T21:01:12.686" v="1930" actId="1076"/>
-          <ac:spMkLst>
-            <pc:docMk/>
-            <pc:sldMk cId="1650964394" sldId="279"/>
-            <ac:spMk id="7" creationId="{5823F138-52E6-46A5-BA65-6C3E5EA16D4B}"/>
-          </ac:spMkLst>
-        </pc:spChg>
-        <pc:spChg chg="add mod">
-          <ac:chgData name="Marcia Moraes" userId="c9c67e8a-58e2-4733-9a1c-5d44fec4775b" providerId="ADAL" clId="{65A51C50-0255-4629-87C5-E90858C71A63}" dt="2023-02-26T21:01:44.936" v="1932" actId="1076"/>
-          <ac:spMkLst>
-            <pc:docMk/>
-            <pc:sldMk cId="1650964394" sldId="279"/>
-            <ac:spMk id="11" creationId="{180CF2B1-1EE4-41F7-B3B3-6549C306D430}"/>
-          </ac:spMkLst>
-        </pc:spChg>
-        <pc:spChg chg="add mod">
-          <ac:chgData name="Marcia Moraes" userId="c9c67e8a-58e2-4733-9a1c-5d44fec4775b" providerId="ADAL" clId="{65A51C50-0255-4629-87C5-E90858C71A63}" dt="2023-02-26T21:01:40.938" v="1931" actId="14100"/>
-          <ac:spMkLst>
-            <pc:docMk/>
-            <pc:sldMk cId="1650964394" sldId="279"/>
-            <ac:spMk id="15" creationId="{A2E58818-2E87-45E4-BB6E-B168391AB88F}"/>
-          </ac:spMkLst>
-        </pc:spChg>
-        <pc:spChg chg="add mod">
-          <ac:chgData name="Marcia Moraes" userId="c9c67e8a-58e2-4733-9a1c-5d44fec4775b" providerId="ADAL" clId="{65A51C50-0255-4629-87C5-E90858C71A63}" dt="2023-02-26T21:01:49.019" v="1933" actId="1076"/>
-          <ac:spMkLst>
-            <pc:docMk/>
-            <pc:sldMk cId="1650964394" sldId="279"/>
-            <ac:spMk id="24" creationId="{EE71B1DA-50D5-4617-A1FC-188698EF6F02}"/>
-          </ac:spMkLst>
-        </pc:spChg>
-        <pc:spChg chg="add mod">
-          <ac:chgData name="Marcia Moraes" userId="c9c67e8a-58e2-4733-9a1c-5d44fec4775b" providerId="ADAL" clId="{65A51C50-0255-4629-87C5-E90858C71A63}" dt="2023-02-26T21:02:28.130" v="1939" actId="14100"/>
-          <ac:spMkLst>
-            <pc:docMk/>
-            <pc:sldMk cId="1650964394" sldId="279"/>
-            <ac:spMk id="27" creationId="{0D0C9E49-6F13-4EAF-9A24-74502EF9AD5C}"/>
-          </ac:spMkLst>
-        </pc:spChg>
-        <pc:cxnChg chg="add mod">
-          <ac:chgData name="Marcia Moraes" userId="c9c67e8a-58e2-4733-9a1c-5d44fec4775b" providerId="ADAL" clId="{65A51C50-0255-4629-87C5-E90858C71A63}" dt="2023-02-26T20:57:11.003" v="1842" actId="14100"/>
-          <ac:cxnSpMkLst>
-            <pc:docMk/>
-            <pc:sldMk cId="1650964394" sldId="279"/>
-            <ac:cxnSpMk id="9" creationId="{C40F1E8E-F3DF-41B4-A614-762911BABE0D}"/>
-          </ac:cxnSpMkLst>
-        </pc:cxnChg>
-        <pc:cxnChg chg="add mod">
-          <ac:chgData name="Marcia Moraes" userId="c9c67e8a-58e2-4733-9a1c-5d44fec4775b" providerId="ADAL" clId="{65A51C50-0255-4629-87C5-E90858C71A63}" dt="2023-02-26T20:57:37.705" v="1844" actId="11529"/>
-          <ac:cxnSpMkLst>
-            <pc:docMk/>
-            <pc:sldMk cId="1650964394" sldId="279"/>
-            <ac:cxnSpMk id="14" creationId="{A23F94F0-7889-48F0-AAD1-6665B3C5E8E2}"/>
-          </ac:cxnSpMkLst>
-        </pc:cxnChg>
-        <pc:cxnChg chg="add del mod">
-          <ac:chgData name="Marcia Moraes" userId="c9c67e8a-58e2-4733-9a1c-5d44fec4775b" providerId="ADAL" clId="{65A51C50-0255-4629-87C5-E90858C71A63}" dt="2023-02-26T20:58:54.822" v="1880" actId="478"/>
-          <ac:cxnSpMkLst>
-            <pc:docMk/>
-            <pc:sldMk cId="1650964394" sldId="279"/>
-            <ac:cxnSpMk id="17" creationId="{AB7D05B6-A1A1-4CE4-996C-ADB3DD2717EA}"/>
-          </ac:cxnSpMkLst>
-        </pc:cxnChg>
-        <pc:cxnChg chg="add mod">
-          <ac:chgData name="Marcia Moraes" userId="c9c67e8a-58e2-4733-9a1c-5d44fec4775b" providerId="ADAL" clId="{65A51C50-0255-4629-87C5-E90858C71A63}" dt="2023-02-26T21:01:54.038" v="1935" actId="1076"/>
-          <ac:cxnSpMkLst>
-            <pc:docMk/>
-            <pc:sldMk cId="1650964394" sldId="279"/>
-            <ac:cxnSpMk id="19" creationId="{D0035236-BFED-49AD-B98F-92905BB8CD83}"/>
-          </ac:cxnSpMkLst>
-        </pc:cxnChg>
-        <pc:cxnChg chg="add mod">
-          <ac:chgData name="Marcia Moraes" userId="c9c67e8a-58e2-4733-9a1c-5d44fec4775b" providerId="ADAL" clId="{65A51C50-0255-4629-87C5-E90858C71A63}" dt="2023-02-26T21:01:51.047" v="1934" actId="1076"/>
-          <ac:cxnSpMkLst>
-            <pc:docMk/>
-            <pc:sldMk cId="1650964394" sldId="279"/>
-            <ac:cxnSpMk id="22" creationId="{0137D8B0-B1A0-423D-B5F1-399A53DF5BC1}"/>
-          </ac:cxnSpMkLst>
-        </pc:cxnChg>
-        <pc:cxnChg chg="add mod">
-          <ac:chgData name="Marcia Moraes" userId="c9c67e8a-58e2-4733-9a1c-5d44fec4775b" providerId="ADAL" clId="{65A51C50-0255-4629-87C5-E90858C71A63}" dt="2023-02-26T21:02:00.603" v="1937" actId="14100"/>
-          <ac:cxnSpMkLst>
-            <pc:docMk/>
-            <pc:sldMk cId="1650964394" sldId="279"/>
-            <ac:cxnSpMk id="26" creationId="{FF17FFA6-2BDD-4358-A328-353717793BA7}"/>
-          </ac:cxnSpMkLst>
-        </pc:cxnChg>
-      </pc:sldChg>
-      <pc:sldChg chg="addSp delSp modSp add delAnim modAnim">
-        <pc:chgData name="Marcia Moraes" userId="c9c67e8a-58e2-4733-9a1c-5d44fec4775b" providerId="ADAL" clId="{65A51C50-0255-4629-87C5-E90858C71A63}" dt="2023-02-26T21:29:39.518" v="2081" actId="1076"/>
-        <pc:sldMkLst>
-          <pc:docMk/>
-          <pc:sldMk cId="1330221005" sldId="280"/>
-        </pc:sldMkLst>
-        <pc:spChg chg="mod">
-          <ac:chgData name="Marcia Moraes" userId="c9c67e8a-58e2-4733-9a1c-5d44fec4775b" providerId="ADAL" clId="{65A51C50-0255-4629-87C5-E90858C71A63}" dt="2023-02-26T21:28:53.756" v="2075" actId="1076"/>
-          <ac:spMkLst>
-            <pc:docMk/>
-            <pc:sldMk cId="1330221005" sldId="280"/>
-            <ac:spMk id="4" creationId="{683FFEF0-EAC6-454C-9E58-568E0B3AD6FB}"/>
-          </ac:spMkLst>
-        </pc:spChg>
-        <pc:spChg chg="del">
-          <ac:chgData name="Marcia Moraes" userId="c9c67e8a-58e2-4733-9a1c-5d44fec4775b" providerId="ADAL" clId="{65A51C50-0255-4629-87C5-E90858C71A63}" dt="2023-02-26T21:03:11.709" v="1943" actId="478"/>
-          <ac:spMkLst>
-            <pc:docMk/>
-            <pc:sldMk cId="1330221005" sldId="280"/>
-            <ac:spMk id="11" creationId="{180CF2B1-1EE4-41F7-B3B3-6549C306D430}"/>
-          </ac:spMkLst>
-        </pc:spChg>
-        <pc:spChg chg="del">
-          <ac:chgData name="Marcia Moraes" userId="c9c67e8a-58e2-4733-9a1c-5d44fec4775b" providerId="ADAL" clId="{65A51C50-0255-4629-87C5-E90858C71A63}" dt="2023-02-26T21:03:08.989" v="1941" actId="478"/>
-          <ac:spMkLst>
-            <pc:docMk/>
-            <pc:sldMk cId="1330221005" sldId="280"/>
-            <ac:spMk id="15" creationId="{A2E58818-2E87-45E4-BB6E-B168391AB88F}"/>
-          </ac:spMkLst>
-        </pc:spChg>
-        <pc:spChg chg="del">
-          <ac:chgData name="Marcia Moraes" userId="c9c67e8a-58e2-4733-9a1c-5d44fec4775b" providerId="ADAL" clId="{65A51C50-0255-4629-87C5-E90858C71A63}" dt="2023-02-26T21:03:13.945" v="1945" actId="478"/>
-          <ac:spMkLst>
-            <pc:docMk/>
-            <pc:sldMk cId="1330221005" sldId="280"/>
-            <ac:spMk id="24" creationId="{EE71B1DA-50D5-4617-A1FC-188698EF6F02}"/>
-          </ac:spMkLst>
-        </pc:spChg>
-        <pc:spChg chg="del">
-          <ac:chgData name="Marcia Moraes" userId="c9c67e8a-58e2-4733-9a1c-5d44fec4775b" providerId="ADAL" clId="{65A51C50-0255-4629-87C5-E90858C71A63}" dt="2023-02-26T21:03:16.212" v="1946" actId="478"/>
-          <ac:spMkLst>
-            <pc:docMk/>
-            <pc:sldMk cId="1330221005" sldId="280"/>
-            <ac:spMk id="27" creationId="{0D0C9E49-6F13-4EAF-9A24-74502EF9AD5C}"/>
-          </ac:spMkLst>
-        </pc:spChg>
-        <pc:picChg chg="add del mod">
-          <ac:chgData name="Marcia Moraes" userId="c9c67e8a-58e2-4733-9a1c-5d44fec4775b" providerId="ADAL" clId="{65A51C50-0255-4629-87C5-E90858C71A63}" dt="2023-02-26T21:28:41.378" v="2068" actId="478"/>
-          <ac:picMkLst>
-            <pc:docMk/>
-            <pc:sldMk cId="1330221005" sldId="280"/>
-            <ac:picMk id="2" creationId="{FF656B1A-B8DC-45D3-8002-B9B082E9E948}"/>
-          </ac:picMkLst>
-        </pc:picChg>
-        <pc:picChg chg="add del mod">
-          <ac:chgData name="Marcia Moraes" userId="c9c67e8a-58e2-4733-9a1c-5d44fec4775b" providerId="ADAL" clId="{65A51C50-0255-4629-87C5-E90858C71A63}" dt="2023-02-26T21:28:57.841" v="2076" actId="478"/>
-          <ac:picMkLst>
-            <pc:docMk/>
-            <pc:sldMk cId="1330221005" sldId="280"/>
-            <ac:picMk id="3" creationId="{C028DF95-D0BF-4248-9CD6-9736F7867E26}"/>
-          </ac:picMkLst>
-        </pc:picChg>
-        <pc:picChg chg="add mod">
-          <ac:chgData name="Marcia Moraes" userId="c9c67e8a-58e2-4733-9a1c-5d44fec4775b" providerId="ADAL" clId="{65A51C50-0255-4629-87C5-E90858C71A63}" dt="2023-02-26T21:29:39.518" v="2081" actId="1076"/>
-          <ac:picMkLst>
-            <pc:docMk/>
-            <pc:sldMk cId="1330221005" sldId="280"/>
-            <ac:picMk id="5" creationId="{8CED171A-DD9C-41F9-B7FB-7C9CF4CCD942}"/>
-          </ac:picMkLst>
-        </pc:picChg>
-        <pc:picChg chg="add mod">
-          <ac:chgData name="Marcia Moraes" userId="c9c67e8a-58e2-4733-9a1c-5d44fec4775b" providerId="ADAL" clId="{65A51C50-0255-4629-87C5-E90858C71A63}" dt="2023-02-26T21:29:33.768" v="2079" actId="1076"/>
-          <ac:picMkLst>
-            <pc:docMk/>
-            <pc:sldMk cId="1330221005" sldId="280"/>
-            <ac:picMk id="6" creationId="{5903CFF9-8CA0-4F66-87A9-77E04A7934D2}"/>
-          </ac:picMkLst>
-        </pc:picChg>
-        <pc:cxnChg chg="del">
-          <ac:chgData name="Marcia Moraes" userId="c9c67e8a-58e2-4733-9a1c-5d44fec4775b" providerId="ADAL" clId="{65A51C50-0255-4629-87C5-E90858C71A63}" dt="2023-02-26T21:03:10.401" v="1942" actId="478"/>
-          <ac:cxnSpMkLst>
-            <pc:docMk/>
-            <pc:sldMk cId="1330221005" sldId="280"/>
-            <ac:cxnSpMk id="9" creationId="{C40F1E8E-F3DF-41B4-A614-762911BABE0D}"/>
-          </ac:cxnSpMkLst>
-        </pc:cxnChg>
-        <pc:cxnChg chg="del">
-          <ac:chgData name="Marcia Moraes" userId="c9c67e8a-58e2-4733-9a1c-5d44fec4775b" providerId="ADAL" clId="{65A51C50-0255-4629-87C5-E90858C71A63}" dt="2023-02-26T21:03:13.118" v="1944" actId="478"/>
-          <ac:cxnSpMkLst>
-            <pc:docMk/>
-            <pc:sldMk cId="1330221005" sldId="280"/>
-            <ac:cxnSpMk id="14" creationId="{A23F94F0-7889-48F0-AAD1-6665B3C5E8E2}"/>
-          </ac:cxnSpMkLst>
-        </pc:cxnChg>
-        <pc:cxnChg chg="del">
-          <ac:chgData name="Marcia Moraes" userId="c9c67e8a-58e2-4733-9a1c-5d44fec4775b" providerId="ADAL" clId="{65A51C50-0255-4629-87C5-E90858C71A63}" dt="2023-02-26T21:03:20.076" v="1949" actId="478"/>
-          <ac:cxnSpMkLst>
-            <pc:docMk/>
-            <pc:sldMk cId="1330221005" sldId="280"/>
-            <ac:cxnSpMk id="19" creationId="{D0035236-BFED-49AD-B98F-92905BB8CD83}"/>
-          </ac:cxnSpMkLst>
-        </pc:cxnChg>
-        <pc:cxnChg chg="del">
-          <ac:chgData name="Marcia Moraes" userId="c9c67e8a-58e2-4733-9a1c-5d44fec4775b" providerId="ADAL" clId="{65A51C50-0255-4629-87C5-E90858C71A63}" dt="2023-02-26T21:03:18.466" v="1948" actId="478"/>
-          <ac:cxnSpMkLst>
-            <pc:docMk/>
-            <pc:sldMk cId="1330221005" sldId="280"/>
-            <ac:cxnSpMk id="22" creationId="{0137D8B0-B1A0-423D-B5F1-399A53DF5BC1}"/>
-          </ac:cxnSpMkLst>
-        </pc:cxnChg>
-        <pc:cxnChg chg="del">
-          <ac:chgData name="Marcia Moraes" userId="c9c67e8a-58e2-4733-9a1c-5d44fec4775b" providerId="ADAL" clId="{65A51C50-0255-4629-87C5-E90858C71A63}" dt="2023-02-26T21:03:17.541" v="1947" actId="478"/>
-          <ac:cxnSpMkLst>
-            <pc:docMk/>
-            <pc:sldMk cId="1330221005" sldId="280"/>
-            <ac:cxnSpMk id="26" creationId="{FF17FFA6-2BDD-4358-A328-353717793BA7}"/>
-          </ac:cxnSpMkLst>
-        </pc:cxnChg>
-      </pc:sldChg>
-      <pc:sldChg chg="addSp delSp modSp add delAnim">
-        <pc:chgData name="Marcia Moraes" userId="c9c67e8a-58e2-4733-9a1c-5d44fec4775b" providerId="ADAL" clId="{65A51C50-0255-4629-87C5-E90858C71A63}" dt="2023-02-26T21:32:21.675" v="2104"/>
-        <pc:sldMkLst>
-          <pc:docMk/>
-          <pc:sldMk cId="1099607367" sldId="281"/>
-        </pc:sldMkLst>
-        <pc:spChg chg="mod">
-          <ac:chgData name="Marcia Moraes" userId="c9c67e8a-58e2-4733-9a1c-5d44fec4775b" providerId="ADAL" clId="{65A51C50-0255-4629-87C5-E90858C71A63}" dt="2023-02-26T21:31:51.504" v="2102" actId="14100"/>
-          <ac:spMkLst>
-            <pc:docMk/>
-            <pc:sldMk cId="1099607367" sldId="281"/>
-            <ac:spMk id="4" creationId="{683FFEF0-EAC6-454C-9E58-568E0B3AD6FB}"/>
-          </ac:spMkLst>
-        </pc:spChg>
-        <pc:spChg chg="add del mod">
-          <ac:chgData name="Marcia Moraes" userId="c9c67e8a-58e2-4733-9a1c-5d44fec4775b" providerId="ADAL" clId="{65A51C50-0255-4629-87C5-E90858C71A63}" dt="2023-02-26T21:31:10.640" v="2091"/>
-          <ac:spMkLst>
-            <pc:docMk/>
-            <pc:sldMk cId="1099607367" sldId="281"/>
-            <ac:spMk id="5" creationId="{8F982901-65A1-4F2D-909D-FA820A12007B}"/>
-          </ac:spMkLst>
-        </pc:spChg>
-        <pc:spChg chg="del">
-          <ac:chgData name="Marcia Moraes" userId="c9c67e8a-58e2-4733-9a1c-5d44fec4775b" providerId="ADAL" clId="{65A51C50-0255-4629-87C5-E90858C71A63}" dt="2023-02-26T21:08:11.958" v="1992" actId="478"/>
-          <ac:spMkLst>
-            <pc:docMk/>
-            <pc:sldMk cId="1099607367" sldId="281"/>
-            <ac:spMk id="7" creationId="{5823F138-52E6-46A5-BA65-6C3E5EA16D4B}"/>
-          </ac:spMkLst>
-        </pc:spChg>
-        <pc:spChg chg="add mod">
-          <ac:chgData name="Marcia Moraes" userId="c9c67e8a-58e2-4733-9a1c-5d44fec4775b" providerId="ADAL" clId="{65A51C50-0255-4629-87C5-E90858C71A63}" dt="2023-02-26T21:32:03.191" v="2103" actId="1076"/>
-          <ac:spMkLst>
-            <pc:docMk/>
-            <pc:sldMk cId="1099607367" sldId="281"/>
-            <ac:spMk id="8" creationId="{59643813-48F6-4330-89E6-7F7AFF43A574}"/>
-          </ac:spMkLst>
-        </pc:spChg>
-        <pc:picChg chg="del">
-          <ac:chgData name="Marcia Moraes" userId="c9c67e8a-58e2-4733-9a1c-5d44fec4775b" providerId="ADAL" clId="{65A51C50-0255-4629-87C5-E90858C71A63}" dt="2023-02-26T21:08:44.046" v="2067" actId="478"/>
-          <ac:picMkLst>
-            <pc:docMk/>
-            <pc:sldMk cId="1099607367" sldId="281"/>
-            <ac:picMk id="2" creationId="{FF656B1A-B8DC-45D3-8002-B9B082E9E948}"/>
-          </ac:picMkLst>
-        </pc:picChg>
-        <pc:picChg chg="del">
-          <ac:chgData name="Marcia Moraes" userId="c9c67e8a-58e2-4733-9a1c-5d44fec4775b" providerId="ADAL" clId="{65A51C50-0255-4629-87C5-E90858C71A63}" dt="2023-02-26T21:08:14.856" v="1993" actId="478"/>
-          <ac:picMkLst>
-            <pc:docMk/>
-            <pc:sldMk cId="1099607367" sldId="281"/>
-            <ac:picMk id="3" creationId="{C028DF95-D0BF-4248-9CD6-9736F7867E26}"/>
-          </ac:picMkLst>
-        </pc:picChg>
-        <pc:picChg chg="add del mod">
-          <ac:chgData name="Marcia Moraes" userId="c9c67e8a-58e2-4733-9a1c-5d44fec4775b" providerId="ADAL" clId="{65A51C50-0255-4629-87C5-E90858C71A63}" dt="2023-02-26T21:31:30.269" v="2096" actId="478"/>
-          <ac:picMkLst>
-            <pc:docMk/>
-            <pc:sldMk cId="1099607367" sldId="281"/>
-            <ac:picMk id="6" creationId="{1BD2405A-0F52-44D8-B13E-F599A53BF03C}"/>
-          </ac:picMkLst>
-        </pc:picChg>
-        <pc:picChg chg="add">
-          <ac:chgData name="Marcia Moraes" userId="c9c67e8a-58e2-4733-9a1c-5d44fec4775b" providerId="ADAL" clId="{65A51C50-0255-4629-87C5-E90858C71A63}" dt="2023-02-26T21:32:21.675" v="2104"/>
-          <ac:picMkLst>
-            <pc:docMk/>
-            <pc:sldMk cId="1099607367" sldId="281"/>
-            <ac:picMk id="9" creationId="{C83A3EE1-14D4-40FB-BE3A-810FA01AD3F6}"/>
-          </ac:picMkLst>
-        </pc:picChg>
-      </pc:sldChg>
-      <pc:sldChg chg="addSp delSp modSp add">
-        <pc:chgData name="Marcia Moraes" userId="c9c67e8a-58e2-4733-9a1c-5d44fec4775b" providerId="ADAL" clId="{65A51C50-0255-4629-87C5-E90858C71A63}" dt="2023-02-26T21:37:24.666" v="2148" actId="1076"/>
-        <pc:sldMkLst>
-          <pc:docMk/>
-          <pc:sldMk cId="3273097351" sldId="282"/>
-        </pc:sldMkLst>
-        <pc:spChg chg="add del mod">
-          <ac:chgData name="Marcia Moraes" userId="c9c67e8a-58e2-4733-9a1c-5d44fec4775b" providerId="ADAL" clId="{65A51C50-0255-4629-87C5-E90858C71A63}" dt="2023-02-26T21:34:01.426" v="2112" actId="478"/>
-          <ac:spMkLst>
-            <pc:docMk/>
-            <pc:sldMk cId="3273097351" sldId="282"/>
-            <ac:spMk id="2" creationId="{A93ADD8D-9890-48C0-8749-233ACD5C7A4D}"/>
-          </ac:spMkLst>
-        </pc:spChg>
-        <pc:spChg chg="add mod">
-          <ac:chgData name="Marcia Moraes" userId="c9c67e8a-58e2-4733-9a1c-5d44fec4775b" providerId="ADAL" clId="{65A51C50-0255-4629-87C5-E90858C71A63}" dt="2023-02-26T21:37:24.666" v="2148" actId="1076"/>
-          <ac:spMkLst>
-            <pc:docMk/>
-            <pc:sldMk cId="3273097351" sldId="282"/>
-            <ac:spMk id="3" creationId="{DA99770A-7669-42D0-86DA-D72FE288604F}"/>
-          </ac:spMkLst>
-        </pc:spChg>
-        <pc:spChg chg="mod">
-          <ac:chgData name="Marcia Moraes" userId="c9c67e8a-58e2-4733-9a1c-5d44fec4775b" providerId="ADAL" clId="{65A51C50-0255-4629-87C5-E90858C71A63}" dt="2023-02-26T21:34:09.344" v="2115" actId="1076"/>
-          <ac:spMkLst>
-            <pc:docMk/>
-            <pc:sldMk cId="3273097351" sldId="282"/>
-            <ac:spMk id="4" creationId="{683FFEF0-EAC6-454C-9E58-568E0B3AD6FB}"/>
-          </ac:spMkLst>
-        </pc:spChg>
-        <pc:spChg chg="add mod">
-          <ac:chgData name="Marcia Moraes" userId="c9c67e8a-58e2-4733-9a1c-5d44fec4775b" providerId="ADAL" clId="{65A51C50-0255-4629-87C5-E90858C71A63}" dt="2023-02-26T21:36:39.159" v="2142" actId="6549"/>
-          <ac:spMkLst>
-            <pc:docMk/>
-            <pc:sldMk cId="3273097351" sldId="282"/>
-            <ac:spMk id="5" creationId="{581360DB-6FE9-4698-9C4F-62565D680FAB}"/>
-          </ac:spMkLst>
-        </pc:spChg>
-        <pc:spChg chg="del">
-          <ac:chgData name="Marcia Moraes" userId="c9c67e8a-58e2-4733-9a1c-5d44fec4775b" providerId="ADAL" clId="{65A51C50-0255-4629-87C5-E90858C71A63}" dt="2023-02-26T21:33:37.162" v="2106" actId="478"/>
-          <ac:spMkLst>
-            <pc:docMk/>
-            <pc:sldMk cId="3273097351" sldId="282"/>
-            <ac:spMk id="8" creationId="{59643813-48F6-4330-89E6-7F7AFF43A574}"/>
-          </ac:spMkLst>
-        </pc:spChg>
-        <pc:picChg chg="del">
-          <ac:chgData name="Marcia Moraes" userId="c9c67e8a-58e2-4733-9a1c-5d44fec4775b" providerId="ADAL" clId="{65A51C50-0255-4629-87C5-E90858C71A63}" dt="2023-02-26T21:33:57.516" v="2111" actId="478"/>
-          <ac:picMkLst>
-            <pc:docMk/>
-            <pc:sldMk cId="3273097351" sldId="282"/>
-            <ac:picMk id="9" creationId="{C83A3EE1-14D4-40FB-BE3A-810FA01AD3F6}"/>
-          </ac:picMkLst>
-        </pc:picChg>
-        <pc:picChg chg="add mod">
-          <ac:chgData name="Marcia Moraes" userId="c9c67e8a-58e2-4733-9a1c-5d44fec4775b" providerId="ADAL" clId="{65A51C50-0255-4629-87C5-E90858C71A63}" dt="2023-02-26T21:37:02.429" v="2146" actId="1076"/>
-          <ac:picMkLst>
-            <pc:docMk/>
-            <pc:sldMk cId="3273097351" sldId="282"/>
-            <ac:picMk id="14" creationId="{0C98370D-7C6B-4BD7-A118-D539F0E77546}"/>
-          </ac:picMkLst>
-        </pc:picChg>
-        <pc:cxnChg chg="add mod">
-          <ac:chgData name="Marcia Moraes" userId="c9c67e8a-58e2-4733-9a1c-5d44fec4775b" providerId="ADAL" clId="{65A51C50-0255-4629-87C5-E90858C71A63}" dt="2023-02-26T21:35:09.537" v="2122" actId="11529"/>
-          <ac:cxnSpMkLst>
-            <pc:docMk/>
-            <pc:sldMk cId="3273097351" sldId="282"/>
-            <ac:cxnSpMk id="7" creationId="{A8F4ACFC-A2E7-406C-ABDE-4E1D83573BFE}"/>
-          </ac:cxnSpMkLst>
-        </pc:cxnChg>
-        <pc:cxnChg chg="add mod">
-          <ac:chgData name="Marcia Moraes" userId="c9c67e8a-58e2-4733-9a1c-5d44fec4775b" providerId="ADAL" clId="{65A51C50-0255-4629-87C5-E90858C71A63}" dt="2023-02-26T21:35:14.399" v="2123" actId="11529"/>
-          <ac:cxnSpMkLst>
-            <pc:docMk/>
-            <pc:sldMk cId="3273097351" sldId="282"/>
-            <ac:cxnSpMk id="11" creationId="{385605A6-DE49-47F3-92C4-DE559BA9490D}"/>
-          </ac:cxnSpMkLst>
-        </pc:cxnChg>
-        <pc:cxnChg chg="add mod">
-          <ac:chgData name="Marcia Moraes" userId="c9c67e8a-58e2-4733-9a1c-5d44fec4775b" providerId="ADAL" clId="{65A51C50-0255-4629-87C5-E90858C71A63}" dt="2023-02-26T21:35:18.253" v="2124" actId="11529"/>
-          <ac:cxnSpMkLst>
-            <pc:docMk/>
-            <pc:sldMk cId="3273097351" sldId="282"/>
-            <ac:cxnSpMk id="13" creationId="{88CB9550-9BA2-480C-BE75-96B8ED02805C}"/>
-          </ac:cxnSpMkLst>
-        </pc:cxnChg>
-      </pc:sldChg>
-      <pc:sldMasterChg chg="modSldLayout">
-        <pc:chgData name="Marcia Moraes" userId="c9c67e8a-58e2-4733-9a1c-5d44fec4775b" providerId="ADAL" clId="{65A51C50-0255-4629-87C5-E90858C71A63}" dt="2023-02-26T17:50:42.614" v="63" actId="20577"/>
-        <pc:sldMasterMkLst>
-          <pc:docMk/>
-          <pc:sldMasterMk cId="3965733437" sldId="2147483648"/>
-        </pc:sldMasterMkLst>
-        <pc:sldLayoutChg chg="modSp">
-          <pc:chgData name="Marcia Moraes" userId="c9c67e8a-58e2-4733-9a1c-5d44fec4775b" providerId="ADAL" clId="{65A51C50-0255-4629-87C5-E90858C71A63}" dt="2023-02-26T17:50:42.614" v="63" actId="20577"/>
-          <pc:sldLayoutMkLst>
-            <pc:docMk/>
-            <pc:sldMasterMk cId="3965733437" sldId="2147483648"/>
-            <pc:sldLayoutMk cId="0" sldId="2147483689"/>
-          </pc:sldLayoutMkLst>
-          <pc:spChg chg="mod">
-            <ac:chgData name="Marcia Moraes" userId="c9c67e8a-58e2-4733-9a1c-5d44fec4775b" providerId="ADAL" clId="{65A51C50-0255-4629-87C5-E90858C71A63}" dt="2023-02-26T17:50:15.572" v="2" actId="1076"/>
-            <ac:spMkLst>
-              <pc:docMk/>
-              <pc:sldMasterMk cId="3965733437" sldId="2147483648"/>
-              <pc:sldLayoutMk cId="0" sldId="2147483689"/>
-              <ac:spMk id="9" creationId="{518974DB-51D0-2C49-9088-48CE2D84AB1C}"/>
-            </ac:spMkLst>
-          </pc:spChg>
-          <pc:spChg chg="mod">
-            <ac:chgData name="Marcia Moraes" userId="c9c67e8a-58e2-4733-9a1c-5d44fec4775b" providerId="ADAL" clId="{65A51C50-0255-4629-87C5-E90858C71A63}" dt="2023-02-26T17:50:42.614" v="63" actId="20577"/>
-            <ac:spMkLst>
-              <pc:docMk/>
-              <pc:sldMasterMk cId="3965733437" sldId="2147483648"/>
-              <pc:sldLayoutMk cId="0" sldId="2147483689"/>
-              <ac:spMk id="11" creationId="{F621E987-BD36-AF48-B11C-CC4BAD65092F}"/>
-            </ac:spMkLst>
-          </pc:spChg>
-          <pc:picChg chg="mod">
-            <ac:chgData name="Marcia Moraes" userId="c9c67e8a-58e2-4733-9a1c-5d44fec4775b" providerId="ADAL" clId="{65A51C50-0255-4629-87C5-E90858C71A63}" dt="2023-02-26T17:50:11.787" v="0" actId="1076"/>
-            <ac:picMkLst>
-              <pc:docMk/>
-              <pc:sldMasterMk cId="3965733437" sldId="2147483648"/>
-              <pc:sldLayoutMk cId="0" sldId="2147483689"/>
-              <ac:picMk id="7" creationId="{00000000-0000-0000-0000-000000000000}"/>
-            </ac:picMkLst>
-          </pc:picChg>
-        </pc:sldLayoutChg>
-      </pc:sldMasterChg>
-    </pc:docChg>
-  </pc:docChgLst>
-  <pc:docChgLst>
-    <pc:chgData name="Marcia Moraes" userId="c9c67e8a-58e2-4733-9a1c-5d44fec4775b" providerId="ADAL" clId="{0B329C1D-C484-4E29-AB46-188B481F43A0}"/>
-    <pc:docChg chg="modSld">
-      <pc:chgData name="Marcia Moraes" userId="c9c67e8a-58e2-4733-9a1c-5d44fec4775b" providerId="ADAL" clId="{0B329C1D-C484-4E29-AB46-188B481F43A0}" dt="2023-02-27T16:37:40.074" v="11" actId="20577"/>
-      <pc:docMkLst>
-        <pc:docMk/>
-      </pc:docMkLst>
-      <pc:sldChg chg="modSp">
-        <pc:chgData name="Marcia Moraes" userId="c9c67e8a-58e2-4733-9a1c-5d44fec4775b" providerId="ADAL" clId="{0B329C1D-C484-4E29-AB46-188B481F43A0}" dt="2023-02-27T16:37:24.583" v="1" actId="20577"/>
-        <pc:sldMkLst>
-          <pc:docMk/>
-          <pc:sldMk cId="2030495812" sldId="275"/>
-        </pc:sldMkLst>
-        <pc:spChg chg="mod">
-          <ac:chgData name="Marcia Moraes" userId="c9c67e8a-58e2-4733-9a1c-5d44fec4775b" providerId="ADAL" clId="{0B329C1D-C484-4E29-AB46-188B481F43A0}" dt="2023-02-27T16:37:24.583" v="1" actId="20577"/>
-          <ac:spMkLst>
-            <pc:docMk/>
-            <pc:sldMk cId="2030495812" sldId="275"/>
-            <ac:spMk id="6" creationId="{81A653D7-0DEA-4DBC-9FD7-E44D47B6CB9F}"/>
-          </ac:spMkLst>
-        </pc:spChg>
-      </pc:sldChg>
-      <pc:sldChg chg="modSp">
-        <pc:chgData name="Marcia Moraes" userId="c9c67e8a-58e2-4733-9a1c-5d44fec4775b" providerId="ADAL" clId="{0B329C1D-C484-4E29-AB46-188B481F43A0}" dt="2023-02-27T16:37:40.074" v="11" actId="20577"/>
-        <pc:sldMkLst>
-          <pc:docMk/>
-          <pc:sldMk cId="3925781527" sldId="276"/>
-        </pc:sldMkLst>
-        <pc:spChg chg="mod">
-          <ac:chgData name="Marcia Moraes" userId="c9c67e8a-58e2-4733-9a1c-5d44fec4775b" providerId="ADAL" clId="{0B329C1D-C484-4E29-AB46-188B481F43A0}" dt="2023-02-27T16:37:40.074" v="11" actId="20577"/>
-          <ac:spMkLst>
-            <pc:docMk/>
-            <pc:sldMk cId="3925781527" sldId="276"/>
-            <ac:spMk id="6" creationId="{81A653D7-0DEA-4DBC-9FD7-E44D47B6CB9F}"/>
-          </ac:spMkLst>
-        </pc:spChg>
+            <ac:graphicFrameMk id="7" creationId="{F04E0A90-8DD1-40A3-8C7E-7EEC69030286}"/>
+          </ac:graphicFrameMkLst>
+        </pc:graphicFrameChg>
       </pc:sldChg>
     </pc:docChg>
   </pc:docChgLst>
@@ -1468,7 +289,7 @@
           <a:p>
             <a:fld id="{4D7E51A5-B478-1E40-8CBB-0DAA8831E99D}" type="datetimeFigureOut">
               <a:rPr lang="en-US" smtClean="0"/>
-              <a:t>2/27/2023</a:t>
+              <a:t>9/14/2023</a:t>
             </a:fld>
             <a:endParaRPr lang="en-US"/>
           </a:p>
@@ -1633,7 +454,7 @@
           <a:p>
             <a:fld id="{D0ED587F-861E-6740-9643-E3DDAE89B8D6}" type="datetimeFigureOut">
               <a:rPr lang="en-US" smtClean="0"/>
-              <a:t>2/27/2023</a:t>
+              <a:t>9/14/2023</a:t>
             </a:fld>
             <a:endParaRPr lang="en-US"/>
           </a:p>
@@ -22497,8 +21318,52 @@
                 <a:cs typeface="Arial"/>
                 <a:sym typeface="Arial"/>
               </a:rPr>
-              <a:t>Lab 09</a:t>
-            </a:r>
+              <a:t>Lab 09 – go to your lab to have </a:t>
+            </a:r>
+            <a:r>
+              <a:rPr kumimoji="0" lang="en-US" sz="2600" b="0" i="0" u="none" strike="noStrike" kern="0" cap="none" spc="0" normalizeH="0" baseline="0" noProof="0" dirty="0" err="1">
+                <a:ln>
+                  <a:noFill/>
+                </a:ln>
+                <a:solidFill>
+                  <a:srgbClr val="000000"/>
+                </a:solidFill>
+                <a:effectLst/>
+                <a:uLnTx/>
+                <a:uFillTx/>
+                <a:latin typeface="Arial"/>
+                <a:ea typeface="+mn-ea"/>
+                <a:cs typeface="Arial"/>
+                <a:sym typeface="Arial"/>
+              </a:rPr>
+              <a:t>th</a:t>
+            </a:r>
+            <a:r>
+              <a:rPr lang="en-US" sz="2600" kern="0" dirty="0">
+                <a:solidFill>
+                  <a:srgbClr val="000000"/>
+                </a:solidFill>
+                <a:latin typeface="Arial"/>
+                <a:cs typeface="Arial"/>
+                <a:sym typeface="Arial"/>
+              </a:rPr>
+              <a:t>e participation points</a:t>
+            </a:r>
+            <a:endParaRPr kumimoji="0" lang="en-US" sz="2600" b="0" i="0" u="none" strike="noStrike" kern="0" cap="none" spc="0" normalizeH="0" baseline="0" noProof="0" dirty="0">
+              <a:ln>
+                <a:noFill/>
+              </a:ln>
+              <a:solidFill>
+                <a:srgbClr val="000000"/>
+              </a:solidFill>
+              <a:effectLst/>
+              <a:uLnTx/>
+              <a:uFillTx/>
+              <a:latin typeface="Arial"/>
+              <a:ea typeface="+mn-ea"/>
+              <a:cs typeface="Arial"/>
+              <a:sym typeface="Arial"/>
+            </a:endParaRPr>
           </a:p>
           <a:p>
             <a:pPr marL="431797" lvl="0" indent="-431797" defTabSz="1381750">
@@ -22600,7 +21465,7 @@
                 <a:cs typeface="Arial"/>
                 <a:sym typeface="Arial"/>
               </a:rPr>
-              <a:t>10</a:t>
+              <a:t>10 – go to your lab to have the participation points</a:t>
             </a:r>
             <a:endParaRPr kumimoji="0" lang="en-US" sz="2600" b="0" i="0" u="none" strike="noStrike" kern="0" cap="none" spc="0" normalizeH="0" baseline="0" noProof="0" dirty="0">
               <a:ln>
@@ -22858,7 +21723,7 @@
         </p:nvSpPr>
         <p:spPr>
           <a:xfrm>
-            <a:off x="11044238" y="3298371"/>
+            <a:off x="8061552" y="91611"/>
             <a:ext cx="2623491" cy="1938992"/>
           </a:xfrm>
           <a:prstGeom prst="rect">
@@ -22901,6 +21766,1033 @@
             <a:r>
               <a:rPr lang="en-US" dirty="0"/>
               <a:t>and catch up if you need!</a:t>
+            </a:r>
+          </a:p>
+        </p:txBody>
+      </p:sp>
+      <p:graphicFrame>
+        <p:nvGraphicFramePr>
+          <p:cNvPr id="7" name="Table 6">
+            <a:extLst>
+              <a:ext uri="{FF2B5EF4-FFF2-40B4-BE49-F238E27FC236}">
+                <a16:creationId xmlns:a16="http://schemas.microsoft.com/office/drawing/2014/main" id="{F04E0A90-8DD1-40A3-8C7E-7EEC69030286}"/>
+              </a:ext>
+            </a:extLst>
+          </p:cNvPr>
+          <p:cNvGraphicFramePr>
+            <a:graphicFrameLocks noGrp="1"/>
+          </p:cNvGraphicFramePr>
+          <p:nvPr>
+            <p:extLst>
+              <p:ext uri="{D42A27DB-BD31-4B8C-83A1-F6EECF244321}">
+                <p14:modId xmlns:p14="http://schemas.microsoft.com/office/powerpoint/2010/main" val="1736723798"/>
+              </p:ext>
+            </p:extLst>
+          </p:nvPr>
+        </p:nvGraphicFramePr>
+        <p:xfrm>
+          <a:off x="10025176" y="4145454"/>
+          <a:ext cx="3671207" cy="3097098"/>
+        </p:xfrm>
+        <a:graphic>
+          <a:graphicData uri="http://schemas.openxmlformats.org/drawingml/2006/table">
+            <a:tbl>
+              <a:tblPr/>
+              <a:tblGrid>
+                <a:gridCol w="1197995">
+                  <a:extLst>
+                    <a:ext uri="{9D8B030D-6E8A-4147-A177-3AD203B41FA5}">
+                      <a16:colId xmlns:a16="http://schemas.microsoft.com/office/drawing/2014/main" val="3463123554"/>
+                    </a:ext>
+                  </a:extLst>
+                </a:gridCol>
+                <a:gridCol w="2473212">
+                  <a:extLst>
+                    <a:ext uri="{9D8B030D-6E8A-4147-A177-3AD203B41FA5}">
+                      <a16:colId xmlns:a16="http://schemas.microsoft.com/office/drawing/2014/main" val="378576746"/>
+                    </a:ext>
+                  </a:extLst>
+                </a:gridCol>
+              </a:tblGrid>
+              <a:tr h="289830">
+                <a:tc>
+                  <a:txBody>
+                    <a:bodyPr/>
+                    <a:lstStyle/>
+                    <a:p>
+                      <a:pPr algn="l"/>
+                      <a:r>
+                        <a:rPr lang="en-US" sz="1700">
+                          <a:solidFill>
+                            <a:srgbClr val="000000"/>
+                          </a:solidFill>
+                          <a:effectLst/>
+                        </a:rPr>
+                        <a:t>Day</a:t>
+                      </a:r>
+                    </a:p>
+                  </a:txBody>
+                  <a:tcPr marL="15681" marR="15681" marT="15681" marB="15681" anchor="ctr">
+                    <a:lnL w="6350" cap="flat" cmpd="sng" algn="ctr">
+                      <a:solidFill>
+                        <a:srgbClr val="E0E0E0"/>
+                      </a:solidFill>
+                      <a:prstDash val="solid"/>
+                      <a:round/>
+                      <a:headEnd type="none" w="med" len="med"/>
+                      <a:tailEnd type="none" w="med" len="med"/>
+                    </a:lnL>
+                    <a:lnR w="6350" cap="flat" cmpd="sng" algn="ctr">
+                      <a:solidFill>
+                        <a:srgbClr val="E0E0E0"/>
+                      </a:solidFill>
+                      <a:prstDash val="solid"/>
+                      <a:round/>
+                      <a:headEnd type="none" w="med" len="med"/>
+                      <a:tailEnd type="none" w="med" len="med"/>
+                    </a:lnR>
+                    <a:lnT w="6350" cap="flat" cmpd="sng" algn="ctr">
+                      <a:solidFill>
+                        <a:srgbClr val="E0E0E0"/>
+                      </a:solidFill>
+                      <a:prstDash val="solid"/>
+                      <a:round/>
+                      <a:headEnd type="none" w="med" len="med"/>
+                      <a:tailEnd type="none" w="med" len="med"/>
+                    </a:lnT>
+                    <a:lnB w="6350" cap="flat" cmpd="sng" algn="ctr">
+                      <a:solidFill>
+                        <a:srgbClr val="E0E0E0"/>
+                      </a:solidFill>
+                      <a:prstDash val="solid"/>
+                      <a:round/>
+                      <a:headEnd type="none" w="med" len="med"/>
+                      <a:tailEnd type="none" w="med" len="med"/>
+                    </a:lnB>
+                    <a:solidFill>
+                      <a:srgbClr val="F7F7F7"/>
+                    </a:solidFill>
+                  </a:tcPr>
+                </a:tc>
+                <a:tc>
+                  <a:txBody>
+                    <a:bodyPr/>
+                    <a:lstStyle/>
+                    <a:p>
+                      <a:pPr algn="l"/>
+                      <a:r>
+                        <a:rPr lang="en-US" sz="1700" dirty="0">
+                          <a:solidFill>
+                            <a:srgbClr val="000000"/>
+                          </a:solidFill>
+                          <a:effectLst/>
+                        </a:rPr>
+                        <a:t>Time : Room</a:t>
+                      </a:r>
+                    </a:p>
+                  </a:txBody>
+                  <a:tcPr marL="15681" marR="15681" marT="15681" marB="15681" anchor="ctr">
+                    <a:lnL w="6350" cap="flat" cmpd="sng" algn="ctr">
+                      <a:solidFill>
+                        <a:srgbClr val="E0E0E0"/>
+                      </a:solidFill>
+                      <a:prstDash val="solid"/>
+                      <a:round/>
+                      <a:headEnd type="none" w="med" len="med"/>
+                      <a:tailEnd type="none" w="med" len="med"/>
+                    </a:lnL>
+                    <a:lnR w="6350" cap="flat" cmpd="sng" algn="ctr">
+                      <a:solidFill>
+                        <a:srgbClr val="E0E0E0"/>
+                      </a:solidFill>
+                      <a:prstDash val="solid"/>
+                      <a:round/>
+                      <a:headEnd type="none" w="med" len="med"/>
+                      <a:tailEnd type="none" w="med" len="med"/>
+                    </a:lnR>
+                    <a:lnT w="6350" cap="flat" cmpd="sng" algn="ctr">
+                      <a:solidFill>
+                        <a:srgbClr val="E0E0E0"/>
+                      </a:solidFill>
+                      <a:prstDash val="solid"/>
+                      <a:round/>
+                      <a:headEnd type="none" w="med" len="med"/>
+                      <a:tailEnd type="none" w="med" len="med"/>
+                    </a:lnT>
+                    <a:lnB w="6350" cap="flat" cmpd="sng" algn="ctr">
+                      <a:solidFill>
+                        <a:srgbClr val="E0E0E0"/>
+                      </a:solidFill>
+                      <a:prstDash val="solid"/>
+                      <a:round/>
+                      <a:headEnd type="none" w="med" len="med"/>
+                      <a:tailEnd type="none" w="med" len="med"/>
+                    </a:lnB>
+                    <a:solidFill>
+                      <a:srgbClr val="F7F7F7"/>
+                    </a:solidFill>
+                  </a:tcPr>
+                </a:tc>
+                <a:extLst>
+                  <a:ext uri="{0D108BD9-81ED-4DB2-BD59-A6C34878D82A}">
+                    <a16:rowId xmlns:a16="http://schemas.microsoft.com/office/drawing/2014/main" val="3967578678"/>
+                  </a:ext>
+                </a:extLst>
+              </a:tr>
+              <a:tr h="548296">
+                <a:tc>
+                  <a:txBody>
+                    <a:bodyPr/>
+                    <a:lstStyle/>
+                    <a:p>
+                      <a:r>
+                        <a:rPr lang="en-US" sz="1700">
+                          <a:effectLst/>
+                        </a:rPr>
+                        <a:t>Monday</a:t>
+                      </a:r>
+                    </a:p>
+                  </a:txBody>
+                  <a:tcPr marL="15681" marR="15681" marT="15681" marB="15681" anchor="ctr">
+                    <a:lnL w="6350" cap="flat" cmpd="sng" algn="ctr">
+                      <a:solidFill>
+                        <a:srgbClr val="E0E0E0"/>
+                      </a:solidFill>
+                      <a:prstDash val="solid"/>
+                      <a:round/>
+                      <a:headEnd type="none" w="med" len="med"/>
+                      <a:tailEnd type="none" w="med" len="med"/>
+                    </a:lnL>
+                    <a:lnR w="6350" cap="flat" cmpd="sng" algn="ctr">
+                      <a:solidFill>
+                        <a:srgbClr val="E0E0E0"/>
+                      </a:solidFill>
+                      <a:prstDash val="solid"/>
+                      <a:round/>
+                      <a:headEnd type="none" w="med" len="med"/>
+                      <a:tailEnd type="none" w="med" len="med"/>
+                    </a:lnR>
+                    <a:lnT w="6350" cap="flat" cmpd="sng" algn="ctr">
+                      <a:solidFill>
+                        <a:srgbClr val="E0E0E0"/>
+                      </a:solidFill>
+                      <a:prstDash val="solid"/>
+                      <a:round/>
+                      <a:headEnd type="none" w="med" len="med"/>
+                      <a:tailEnd type="none" w="med" len="med"/>
+                    </a:lnT>
+                    <a:lnB w="6350" cap="flat" cmpd="sng" algn="ctr">
+                      <a:solidFill>
+                        <a:srgbClr val="E0E0E0"/>
+                      </a:solidFill>
+                      <a:prstDash val="solid"/>
+                      <a:round/>
+                      <a:headEnd type="none" w="med" len="med"/>
+                      <a:tailEnd type="none" w="med" len="med"/>
+                    </a:lnB>
+                    <a:solidFill>
+                      <a:srgbClr val="FFFFFF"/>
+                    </a:solidFill>
+                  </a:tcPr>
+                </a:tc>
+                <a:tc>
+                  <a:txBody>
+                    <a:bodyPr/>
+                    <a:lstStyle/>
+                    <a:p>
+                      <a:r>
+                        <a:rPr lang="en-US" sz="1700">
+                          <a:effectLst/>
+                        </a:rPr>
+                        <a:t>12 PM - 2 PM : CSB 120</a:t>
+                      </a:r>
+                    </a:p>
+                  </a:txBody>
+                  <a:tcPr marL="15681" marR="15681" marT="15681" marB="15681" anchor="ctr">
+                    <a:lnL w="6350" cap="flat" cmpd="sng" algn="ctr">
+                      <a:solidFill>
+                        <a:srgbClr val="E0E0E0"/>
+                      </a:solidFill>
+                      <a:prstDash val="solid"/>
+                      <a:round/>
+                      <a:headEnd type="none" w="med" len="med"/>
+                      <a:tailEnd type="none" w="med" len="med"/>
+                    </a:lnL>
+                    <a:lnR w="6350" cap="flat" cmpd="sng" algn="ctr">
+                      <a:solidFill>
+                        <a:srgbClr val="E0E0E0"/>
+                      </a:solidFill>
+                      <a:prstDash val="solid"/>
+                      <a:round/>
+                      <a:headEnd type="none" w="med" len="med"/>
+                      <a:tailEnd type="none" w="med" len="med"/>
+                    </a:lnR>
+                    <a:lnT w="6350" cap="flat" cmpd="sng" algn="ctr">
+                      <a:solidFill>
+                        <a:srgbClr val="E0E0E0"/>
+                      </a:solidFill>
+                      <a:prstDash val="solid"/>
+                      <a:round/>
+                      <a:headEnd type="none" w="med" len="med"/>
+                      <a:tailEnd type="none" w="med" len="med"/>
+                    </a:lnT>
+                    <a:lnB w="6350" cap="flat" cmpd="sng" algn="ctr">
+                      <a:solidFill>
+                        <a:srgbClr val="E0E0E0"/>
+                      </a:solidFill>
+                      <a:prstDash val="solid"/>
+                      <a:round/>
+                      <a:headEnd type="none" w="med" len="med"/>
+                      <a:tailEnd type="none" w="med" len="med"/>
+                    </a:lnB>
+                    <a:solidFill>
+                      <a:srgbClr val="FFFFFF"/>
+                    </a:solidFill>
+                  </a:tcPr>
+                </a:tc>
+                <a:extLst>
+                  <a:ext uri="{0D108BD9-81ED-4DB2-BD59-A6C34878D82A}">
+                    <a16:rowId xmlns:a16="http://schemas.microsoft.com/office/drawing/2014/main" val="4272848274"/>
+                  </a:ext>
+                </a:extLst>
+              </a:tr>
+              <a:tr h="289830">
+                <a:tc>
+                  <a:txBody>
+                    <a:bodyPr/>
+                    <a:lstStyle/>
+                    <a:p>
+                      <a:r>
+                        <a:rPr lang="en-US" sz="1700">
+                          <a:effectLst/>
+                        </a:rPr>
+                        <a:t>Tuesday</a:t>
+                      </a:r>
+                    </a:p>
+                  </a:txBody>
+                  <a:tcPr marL="15681" marR="15681" marT="15681" marB="15681" anchor="ctr">
+                    <a:lnL w="6350" cap="flat" cmpd="sng" algn="ctr">
+                      <a:solidFill>
+                        <a:srgbClr val="E0E0E0"/>
+                      </a:solidFill>
+                      <a:prstDash val="solid"/>
+                      <a:round/>
+                      <a:headEnd type="none" w="med" len="med"/>
+                      <a:tailEnd type="none" w="med" len="med"/>
+                    </a:lnL>
+                    <a:lnR w="6350" cap="flat" cmpd="sng" algn="ctr">
+                      <a:solidFill>
+                        <a:srgbClr val="E0E0E0"/>
+                      </a:solidFill>
+                      <a:prstDash val="solid"/>
+                      <a:round/>
+                      <a:headEnd type="none" w="med" len="med"/>
+                      <a:tailEnd type="none" w="med" len="med"/>
+                    </a:lnR>
+                    <a:lnT w="6350" cap="flat" cmpd="sng" algn="ctr">
+                      <a:solidFill>
+                        <a:srgbClr val="E0E0E0"/>
+                      </a:solidFill>
+                      <a:prstDash val="solid"/>
+                      <a:round/>
+                      <a:headEnd type="none" w="med" len="med"/>
+                      <a:tailEnd type="none" w="med" len="med"/>
+                    </a:lnT>
+                    <a:lnB w="6350" cap="flat" cmpd="sng" algn="ctr">
+                      <a:solidFill>
+                        <a:srgbClr val="E0E0E0"/>
+                      </a:solidFill>
+                      <a:prstDash val="solid"/>
+                      <a:round/>
+                      <a:headEnd type="none" w="med" len="med"/>
+                      <a:tailEnd type="none" w="med" len="med"/>
+                    </a:lnB>
+                    <a:solidFill>
+                      <a:srgbClr val="FFFFFF"/>
+                    </a:solidFill>
+                  </a:tcPr>
+                </a:tc>
+                <a:tc>
+                  <a:txBody>
+                    <a:bodyPr/>
+                    <a:lstStyle/>
+                    <a:p>
+                      <a:r>
+                        <a:rPr lang="en-US" sz="1700">
+                          <a:effectLst/>
+                        </a:rPr>
+                        <a:t>6 PM - 8 PM : Teams</a:t>
+                      </a:r>
+                    </a:p>
+                  </a:txBody>
+                  <a:tcPr marL="15681" marR="15681" marT="15681" marB="15681" anchor="ctr">
+                    <a:lnL w="6350" cap="flat" cmpd="sng" algn="ctr">
+                      <a:solidFill>
+                        <a:srgbClr val="E0E0E0"/>
+                      </a:solidFill>
+                      <a:prstDash val="solid"/>
+                      <a:round/>
+                      <a:headEnd type="none" w="med" len="med"/>
+                      <a:tailEnd type="none" w="med" len="med"/>
+                    </a:lnL>
+                    <a:lnR w="6350" cap="flat" cmpd="sng" algn="ctr">
+                      <a:solidFill>
+                        <a:srgbClr val="E0E0E0"/>
+                      </a:solidFill>
+                      <a:prstDash val="solid"/>
+                      <a:round/>
+                      <a:headEnd type="none" w="med" len="med"/>
+                      <a:tailEnd type="none" w="med" len="med"/>
+                    </a:lnR>
+                    <a:lnT w="6350" cap="flat" cmpd="sng" algn="ctr">
+                      <a:solidFill>
+                        <a:srgbClr val="E0E0E0"/>
+                      </a:solidFill>
+                      <a:prstDash val="solid"/>
+                      <a:round/>
+                      <a:headEnd type="none" w="med" len="med"/>
+                      <a:tailEnd type="none" w="med" len="med"/>
+                    </a:lnT>
+                    <a:lnB w="6350" cap="flat" cmpd="sng" algn="ctr">
+                      <a:solidFill>
+                        <a:srgbClr val="E0E0E0"/>
+                      </a:solidFill>
+                      <a:prstDash val="solid"/>
+                      <a:round/>
+                      <a:headEnd type="none" w="med" len="med"/>
+                      <a:tailEnd type="none" w="med" len="med"/>
+                    </a:lnB>
+                    <a:solidFill>
+                      <a:srgbClr val="FFFFFF"/>
+                    </a:solidFill>
+                  </a:tcPr>
+                </a:tc>
+                <a:extLst>
+                  <a:ext uri="{0D108BD9-81ED-4DB2-BD59-A6C34878D82A}">
+                    <a16:rowId xmlns:a16="http://schemas.microsoft.com/office/drawing/2014/main" val="369786881"/>
+                  </a:ext>
+                </a:extLst>
+              </a:tr>
+              <a:tr h="548296">
+                <a:tc>
+                  <a:txBody>
+                    <a:bodyPr/>
+                    <a:lstStyle/>
+                    <a:p>
+                      <a:r>
+                        <a:rPr lang="en-US" sz="1700">
+                          <a:effectLst/>
+                        </a:rPr>
+                        <a:t>Wednesday</a:t>
+                      </a:r>
+                    </a:p>
+                  </a:txBody>
+                  <a:tcPr marL="15681" marR="15681" marT="15681" marB="15681" anchor="ctr">
+                    <a:lnL w="6350" cap="flat" cmpd="sng" algn="ctr">
+                      <a:solidFill>
+                        <a:srgbClr val="E0E0E0"/>
+                      </a:solidFill>
+                      <a:prstDash val="solid"/>
+                      <a:round/>
+                      <a:headEnd type="none" w="med" len="med"/>
+                      <a:tailEnd type="none" w="med" len="med"/>
+                    </a:lnL>
+                    <a:lnR w="6350" cap="flat" cmpd="sng" algn="ctr">
+                      <a:solidFill>
+                        <a:srgbClr val="E0E0E0"/>
+                      </a:solidFill>
+                      <a:prstDash val="solid"/>
+                      <a:round/>
+                      <a:headEnd type="none" w="med" len="med"/>
+                      <a:tailEnd type="none" w="med" len="med"/>
+                    </a:lnR>
+                    <a:lnT w="6350" cap="flat" cmpd="sng" algn="ctr">
+                      <a:solidFill>
+                        <a:srgbClr val="E0E0E0"/>
+                      </a:solidFill>
+                      <a:prstDash val="solid"/>
+                      <a:round/>
+                      <a:headEnd type="none" w="med" len="med"/>
+                      <a:tailEnd type="none" w="med" len="med"/>
+                    </a:lnT>
+                    <a:lnB w="6350" cap="flat" cmpd="sng" algn="ctr">
+                      <a:solidFill>
+                        <a:srgbClr val="E0E0E0"/>
+                      </a:solidFill>
+                      <a:prstDash val="solid"/>
+                      <a:round/>
+                      <a:headEnd type="none" w="med" len="med"/>
+                      <a:tailEnd type="none" w="med" len="med"/>
+                    </a:lnB>
+                    <a:solidFill>
+                      <a:srgbClr val="FFFFFF"/>
+                    </a:solidFill>
+                  </a:tcPr>
+                </a:tc>
+                <a:tc>
+                  <a:txBody>
+                    <a:bodyPr/>
+                    <a:lstStyle/>
+                    <a:p>
+                      <a:r>
+                        <a:rPr lang="en-US" sz="1700">
+                          <a:effectLst/>
+                        </a:rPr>
+                        <a:t>3 PM - 5 PM : CSB 120</a:t>
+                      </a:r>
+                    </a:p>
+                  </a:txBody>
+                  <a:tcPr marL="15681" marR="15681" marT="15681" marB="15681" anchor="ctr">
+                    <a:lnL w="6350" cap="flat" cmpd="sng" algn="ctr">
+                      <a:solidFill>
+                        <a:srgbClr val="E0E0E0"/>
+                      </a:solidFill>
+                      <a:prstDash val="solid"/>
+                      <a:round/>
+                      <a:headEnd type="none" w="med" len="med"/>
+                      <a:tailEnd type="none" w="med" len="med"/>
+                    </a:lnL>
+                    <a:lnR w="6350" cap="flat" cmpd="sng" algn="ctr">
+                      <a:solidFill>
+                        <a:srgbClr val="E0E0E0"/>
+                      </a:solidFill>
+                      <a:prstDash val="solid"/>
+                      <a:round/>
+                      <a:headEnd type="none" w="med" len="med"/>
+                      <a:tailEnd type="none" w="med" len="med"/>
+                    </a:lnR>
+                    <a:lnT w="6350" cap="flat" cmpd="sng" algn="ctr">
+                      <a:solidFill>
+                        <a:srgbClr val="E0E0E0"/>
+                      </a:solidFill>
+                      <a:prstDash val="solid"/>
+                      <a:round/>
+                      <a:headEnd type="none" w="med" len="med"/>
+                      <a:tailEnd type="none" w="med" len="med"/>
+                    </a:lnT>
+                    <a:lnB w="6350" cap="flat" cmpd="sng" algn="ctr">
+                      <a:solidFill>
+                        <a:srgbClr val="E0E0E0"/>
+                      </a:solidFill>
+                      <a:prstDash val="solid"/>
+                      <a:round/>
+                      <a:headEnd type="none" w="med" len="med"/>
+                      <a:tailEnd type="none" w="med" len="med"/>
+                    </a:lnB>
+                    <a:solidFill>
+                      <a:srgbClr val="FFFFFF"/>
+                    </a:solidFill>
+                  </a:tcPr>
+                </a:tc>
+                <a:extLst>
+                  <a:ext uri="{0D108BD9-81ED-4DB2-BD59-A6C34878D82A}">
+                    <a16:rowId xmlns:a16="http://schemas.microsoft.com/office/drawing/2014/main" val="252902362"/>
+                  </a:ext>
+                </a:extLst>
+              </a:tr>
+              <a:tr h="289830">
+                <a:tc>
+                  <a:txBody>
+                    <a:bodyPr/>
+                    <a:lstStyle/>
+                    <a:p>
+                      <a:r>
+                        <a:rPr lang="en-US" sz="1700">
+                          <a:effectLst/>
+                        </a:rPr>
+                        <a:t>Thursday</a:t>
+                      </a:r>
+                    </a:p>
+                  </a:txBody>
+                  <a:tcPr marL="15681" marR="15681" marT="15681" marB="15681" anchor="ctr">
+                    <a:lnL w="6350" cap="flat" cmpd="sng" algn="ctr">
+                      <a:solidFill>
+                        <a:srgbClr val="E0E0E0"/>
+                      </a:solidFill>
+                      <a:prstDash val="solid"/>
+                      <a:round/>
+                      <a:headEnd type="none" w="med" len="med"/>
+                      <a:tailEnd type="none" w="med" len="med"/>
+                    </a:lnL>
+                    <a:lnR w="6350" cap="flat" cmpd="sng" algn="ctr">
+                      <a:solidFill>
+                        <a:srgbClr val="E0E0E0"/>
+                      </a:solidFill>
+                      <a:prstDash val="solid"/>
+                      <a:round/>
+                      <a:headEnd type="none" w="med" len="med"/>
+                      <a:tailEnd type="none" w="med" len="med"/>
+                    </a:lnR>
+                    <a:lnT w="6350" cap="flat" cmpd="sng" algn="ctr">
+                      <a:solidFill>
+                        <a:srgbClr val="E0E0E0"/>
+                      </a:solidFill>
+                      <a:prstDash val="solid"/>
+                      <a:round/>
+                      <a:headEnd type="none" w="med" len="med"/>
+                      <a:tailEnd type="none" w="med" len="med"/>
+                    </a:lnT>
+                    <a:lnB w="6350" cap="flat" cmpd="sng" algn="ctr">
+                      <a:solidFill>
+                        <a:srgbClr val="E0E0E0"/>
+                      </a:solidFill>
+                      <a:prstDash val="solid"/>
+                      <a:round/>
+                      <a:headEnd type="none" w="med" len="med"/>
+                      <a:tailEnd type="none" w="med" len="med"/>
+                    </a:lnB>
+                    <a:solidFill>
+                      <a:srgbClr val="FFFFFF"/>
+                    </a:solidFill>
+                  </a:tcPr>
+                </a:tc>
+                <a:tc>
+                  <a:txBody>
+                    <a:bodyPr/>
+                    <a:lstStyle/>
+                    <a:p>
+                      <a:r>
+                        <a:rPr lang="en-US" sz="1700">
+                          <a:effectLst/>
+                        </a:rPr>
+                        <a:t>6 PM - 8 PM : Teams</a:t>
+                      </a:r>
+                    </a:p>
+                  </a:txBody>
+                  <a:tcPr marL="15681" marR="15681" marT="15681" marB="15681" anchor="ctr">
+                    <a:lnL w="6350" cap="flat" cmpd="sng" algn="ctr">
+                      <a:solidFill>
+                        <a:srgbClr val="E0E0E0"/>
+                      </a:solidFill>
+                      <a:prstDash val="solid"/>
+                      <a:round/>
+                      <a:headEnd type="none" w="med" len="med"/>
+                      <a:tailEnd type="none" w="med" len="med"/>
+                    </a:lnL>
+                    <a:lnR w="6350" cap="flat" cmpd="sng" algn="ctr">
+                      <a:solidFill>
+                        <a:srgbClr val="E0E0E0"/>
+                      </a:solidFill>
+                      <a:prstDash val="solid"/>
+                      <a:round/>
+                      <a:headEnd type="none" w="med" len="med"/>
+                      <a:tailEnd type="none" w="med" len="med"/>
+                    </a:lnR>
+                    <a:lnT w="6350" cap="flat" cmpd="sng" algn="ctr">
+                      <a:solidFill>
+                        <a:srgbClr val="E0E0E0"/>
+                      </a:solidFill>
+                      <a:prstDash val="solid"/>
+                      <a:round/>
+                      <a:headEnd type="none" w="med" len="med"/>
+                      <a:tailEnd type="none" w="med" len="med"/>
+                    </a:lnT>
+                    <a:lnB w="6350" cap="flat" cmpd="sng" algn="ctr">
+                      <a:solidFill>
+                        <a:srgbClr val="E0E0E0"/>
+                      </a:solidFill>
+                      <a:prstDash val="solid"/>
+                      <a:round/>
+                      <a:headEnd type="none" w="med" len="med"/>
+                      <a:tailEnd type="none" w="med" len="med"/>
+                    </a:lnB>
+                    <a:solidFill>
+                      <a:srgbClr val="FFFFFF"/>
+                    </a:solidFill>
+                  </a:tcPr>
+                </a:tc>
+                <a:extLst>
+                  <a:ext uri="{0D108BD9-81ED-4DB2-BD59-A6C34878D82A}">
+                    <a16:rowId xmlns:a16="http://schemas.microsoft.com/office/drawing/2014/main" val="2125508035"/>
+                  </a:ext>
+                </a:extLst>
+              </a:tr>
+              <a:tr h="548296">
+                <a:tc>
+                  <a:txBody>
+                    <a:bodyPr/>
+                    <a:lstStyle/>
+                    <a:p>
+                      <a:r>
+                        <a:rPr lang="en-US" sz="1700">
+                          <a:effectLst/>
+                        </a:rPr>
+                        <a:t>Friday</a:t>
+                      </a:r>
+                    </a:p>
+                  </a:txBody>
+                  <a:tcPr marL="15681" marR="15681" marT="15681" marB="15681" anchor="ctr">
+                    <a:lnL w="6350" cap="flat" cmpd="sng" algn="ctr">
+                      <a:solidFill>
+                        <a:srgbClr val="E0E0E0"/>
+                      </a:solidFill>
+                      <a:prstDash val="solid"/>
+                      <a:round/>
+                      <a:headEnd type="none" w="med" len="med"/>
+                      <a:tailEnd type="none" w="med" len="med"/>
+                    </a:lnL>
+                    <a:lnR w="6350" cap="flat" cmpd="sng" algn="ctr">
+                      <a:solidFill>
+                        <a:srgbClr val="E0E0E0"/>
+                      </a:solidFill>
+                      <a:prstDash val="solid"/>
+                      <a:round/>
+                      <a:headEnd type="none" w="med" len="med"/>
+                      <a:tailEnd type="none" w="med" len="med"/>
+                    </a:lnR>
+                    <a:lnT w="6350" cap="flat" cmpd="sng" algn="ctr">
+                      <a:solidFill>
+                        <a:srgbClr val="E0E0E0"/>
+                      </a:solidFill>
+                      <a:prstDash val="solid"/>
+                      <a:round/>
+                      <a:headEnd type="none" w="med" len="med"/>
+                      <a:tailEnd type="none" w="med" len="med"/>
+                    </a:lnT>
+                    <a:lnB w="6350" cap="flat" cmpd="sng" algn="ctr">
+                      <a:solidFill>
+                        <a:srgbClr val="E0E0E0"/>
+                      </a:solidFill>
+                      <a:prstDash val="solid"/>
+                      <a:round/>
+                      <a:headEnd type="none" w="med" len="med"/>
+                      <a:tailEnd type="none" w="med" len="med"/>
+                    </a:lnB>
+                    <a:solidFill>
+                      <a:srgbClr val="FFFFFF"/>
+                    </a:solidFill>
+                  </a:tcPr>
+                </a:tc>
+                <a:tc>
+                  <a:txBody>
+                    <a:bodyPr/>
+                    <a:lstStyle/>
+                    <a:p>
+                      <a:r>
+                        <a:rPr lang="en-US" sz="1700">
+                          <a:effectLst/>
+                        </a:rPr>
+                        <a:t>3 PM - 5 PM : CSB 120</a:t>
+                      </a:r>
+                    </a:p>
+                  </a:txBody>
+                  <a:tcPr marL="15681" marR="15681" marT="15681" marB="15681" anchor="ctr">
+                    <a:lnL w="6350" cap="flat" cmpd="sng" algn="ctr">
+                      <a:solidFill>
+                        <a:srgbClr val="E0E0E0"/>
+                      </a:solidFill>
+                      <a:prstDash val="solid"/>
+                      <a:round/>
+                      <a:headEnd type="none" w="med" len="med"/>
+                      <a:tailEnd type="none" w="med" len="med"/>
+                    </a:lnL>
+                    <a:lnR w="6350" cap="flat" cmpd="sng" algn="ctr">
+                      <a:solidFill>
+                        <a:srgbClr val="E0E0E0"/>
+                      </a:solidFill>
+                      <a:prstDash val="solid"/>
+                      <a:round/>
+                      <a:headEnd type="none" w="med" len="med"/>
+                      <a:tailEnd type="none" w="med" len="med"/>
+                    </a:lnR>
+                    <a:lnT w="6350" cap="flat" cmpd="sng" algn="ctr">
+                      <a:solidFill>
+                        <a:srgbClr val="E0E0E0"/>
+                      </a:solidFill>
+                      <a:prstDash val="solid"/>
+                      <a:round/>
+                      <a:headEnd type="none" w="med" len="med"/>
+                      <a:tailEnd type="none" w="med" len="med"/>
+                    </a:lnT>
+                    <a:lnB w="6350" cap="flat" cmpd="sng" algn="ctr">
+                      <a:solidFill>
+                        <a:srgbClr val="E0E0E0"/>
+                      </a:solidFill>
+                      <a:prstDash val="solid"/>
+                      <a:round/>
+                      <a:headEnd type="none" w="med" len="med"/>
+                      <a:tailEnd type="none" w="med" len="med"/>
+                    </a:lnB>
+                    <a:solidFill>
+                      <a:srgbClr val="FFFFFF"/>
+                    </a:solidFill>
+                  </a:tcPr>
+                </a:tc>
+                <a:extLst>
+                  <a:ext uri="{0D108BD9-81ED-4DB2-BD59-A6C34878D82A}">
+                    <a16:rowId xmlns:a16="http://schemas.microsoft.com/office/drawing/2014/main" val="772220127"/>
+                  </a:ext>
+                </a:extLst>
+              </a:tr>
+              <a:tr h="289830">
+                <a:tc>
+                  <a:txBody>
+                    <a:bodyPr/>
+                    <a:lstStyle/>
+                    <a:p>
+                      <a:r>
+                        <a:rPr lang="en-US" sz="1700">
+                          <a:effectLst/>
+                        </a:rPr>
+                        <a:t>Saturday</a:t>
+                      </a:r>
+                    </a:p>
+                  </a:txBody>
+                  <a:tcPr marL="15681" marR="15681" marT="15681" marB="15681" anchor="ctr">
+                    <a:lnL w="6350" cap="flat" cmpd="sng" algn="ctr">
+                      <a:solidFill>
+                        <a:srgbClr val="E0E0E0"/>
+                      </a:solidFill>
+                      <a:prstDash val="solid"/>
+                      <a:round/>
+                      <a:headEnd type="none" w="med" len="med"/>
+                      <a:tailEnd type="none" w="med" len="med"/>
+                    </a:lnL>
+                    <a:lnR w="6350" cap="flat" cmpd="sng" algn="ctr">
+                      <a:solidFill>
+                        <a:srgbClr val="E0E0E0"/>
+                      </a:solidFill>
+                      <a:prstDash val="solid"/>
+                      <a:round/>
+                      <a:headEnd type="none" w="med" len="med"/>
+                      <a:tailEnd type="none" w="med" len="med"/>
+                    </a:lnR>
+                    <a:lnT w="6350" cap="flat" cmpd="sng" algn="ctr">
+                      <a:solidFill>
+                        <a:srgbClr val="E0E0E0"/>
+                      </a:solidFill>
+                      <a:prstDash val="solid"/>
+                      <a:round/>
+                      <a:headEnd type="none" w="med" len="med"/>
+                      <a:tailEnd type="none" w="med" len="med"/>
+                    </a:lnT>
+                    <a:lnB w="6350" cap="flat" cmpd="sng" algn="ctr">
+                      <a:solidFill>
+                        <a:srgbClr val="E0E0E0"/>
+                      </a:solidFill>
+                      <a:prstDash val="solid"/>
+                      <a:round/>
+                      <a:headEnd type="none" w="med" len="med"/>
+                      <a:tailEnd type="none" w="med" len="med"/>
+                    </a:lnB>
+                    <a:solidFill>
+                      <a:srgbClr val="FFFFFF"/>
+                    </a:solidFill>
+                  </a:tcPr>
+                </a:tc>
+                <a:tc>
+                  <a:txBody>
+                    <a:bodyPr/>
+                    <a:lstStyle/>
+                    <a:p>
+                      <a:r>
+                        <a:rPr lang="en-US" sz="1700">
+                          <a:effectLst/>
+                        </a:rPr>
+                        <a:t>12 PM - 4 PM : Teams</a:t>
+                      </a:r>
+                    </a:p>
+                  </a:txBody>
+                  <a:tcPr marL="15681" marR="15681" marT="15681" marB="15681" anchor="ctr">
+                    <a:lnL w="6350" cap="flat" cmpd="sng" algn="ctr">
+                      <a:solidFill>
+                        <a:srgbClr val="E0E0E0"/>
+                      </a:solidFill>
+                      <a:prstDash val="solid"/>
+                      <a:round/>
+                      <a:headEnd type="none" w="med" len="med"/>
+                      <a:tailEnd type="none" w="med" len="med"/>
+                    </a:lnL>
+                    <a:lnR w="6350" cap="flat" cmpd="sng" algn="ctr">
+                      <a:solidFill>
+                        <a:srgbClr val="E0E0E0"/>
+                      </a:solidFill>
+                      <a:prstDash val="solid"/>
+                      <a:round/>
+                      <a:headEnd type="none" w="med" len="med"/>
+                      <a:tailEnd type="none" w="med" len="med"/>
+                    </a:lnR>
+                    <a:lnT w="6350" cap="flat" cmpd="sng" algn="ctr">
+                      <a:solidFill>
+                        <a:srgbClr val="E0E0E0"/>
+                      </a:solidFill>
+                      <a:prstDash val="solid"/>
+                      <a:round/>
+                      <a:headEnd type="none" w="med" len="med"/>
+                      <a:tailEnd type="none" w="med" len="med"/>
+                    </a:lnT>
+                    <a:lnB w="6350" cap="flat" cmpd="sng" algn="ctr">
+                      <a:solidFill>
+                        <a:srgbClr val="E0E0E0"/>
+                      </a:solidFill>
+                      <a:prstDash val="solid"/>
+                      <a:round/>
+                      <a:headEnd type="none" w="med" len="med"/>
+                      <a:tailEnd type="none" w="med" len="med"/>
+                    </a:lnB>
+                    <a:solidFill>
+                      <a:srgbClr val="FFFFFF"/>
+                    </a:solidFill>
+                  </a:tcPr>
+                </a:tc>
+                <a:extLst>
+                  <a:ext uri="{0D108BD9-81ED-4DB2-BD59-A6C34878D82A}">
+                    <a16:rowId xmlns:a16="http://schemas.microsoft.com/office/drawing/2014/main" val="3754499503"/>
+                  </a:ext>
+                </a:extLst>
+              </a:tr>
+              <a:tr h="289830">
+                <a:tc>
+                  <a:txBody>
+                    <a:bodyPr/>
+                    <a:lstStyle/>
+                    <a:p>
+                      <a:r>
+                        <a:rPr lang="en-US" sz="1700">
+                          <a:effectLst/>
+                        </a:rPr>
+                        <a:t>Sunday</a:t>
+                      </a:r>
+                    </a:p>
+                  </a:txBody>
+                  <a:tcPr marL="15681" marR="15681" marT="15681" marB="15681" anchor="ctr">
+                    <a:lnL w="6350" cap="flat" cmpd="sng" algn="ctr">
+                      <a:solidFill>
+                        <a:srgbClr val="E0E0E0"/>
+                      </a:solidFill>
+                      <a:prstDash val="solid"/>
+                      <a:round/>
+                      <a:headEnd type="none" w="med" len="med"/>
+                      <a:tailEnd type="none" w="med" len="med"/>
+                    </a:lnL>
+                    <a:lnR w="6350" cap="flat" cmpd="sng" algn="ctr">
+                      <a:solidFill>
+                        <a:srgbClr val="E0E0E0"/>
+                      </a:solidFill>
+                      <a:prstDash val="solid"/>
+                      <a:round/>
+                      <a:headEnd type="none" w="med" len="med"/>
+                      <a:tailEnd type="none" w="med" len="med"/>
+                    </a:lnR>
+                    <a:lnT w="6350" cap="flat" cmpd="sng" algn="ctr">
+                      <a:solidFill>
+                        <a:srgbClr val="E0E0E0"/>
+                      </a:solidFill>
+                      <a:prstDash val="solid"/>
+                      <a:round/>
+                      <a:headEnd type="none" w="med" len="med"/>
+                      <a:tailEnd type="none" w="med" len="med"/>
+                    </a:lnT>
+                    <a:lnB w="6350" cap="flat" cmpd="sng" algn="ctr">
+                      <a:solidFill>
+                        <a:srgbClr val="E0E0E0"/>
+                      </a:solidFill>
+                      <a:prstDash val="solid"/>
+                      <a:round/>
+                      <a:headEnd type="none" w="med" len="med"/>
+                      <a:tailEnd type="none" w="med" len="med"/>
+                    </a:lnB>
+                    <a:solidFill>
+                      <a:srgbClr val="FFFFFF"/>
+                    </a:solidFill>
+                  </a:tcPr>
+                </a:tc>
+                <a:tc>
+                  <a:txBody>
+                    <a:bodyPr/>
+                    <a:lstStyle/>
+                    <a:p>
+                      <a:r>
+                        <a:rPr lang="en-US" sz="1700" dirty="0">
+                          <a:effectLst/>
+                        </a:rPr>
+                        <a:t>12 PM - 4 PM : Teams</a:t>
+                      </a:r>
+                    </a:p>
+                  </a:txBody>
+                  <a:tcPr marL="15681" marR="15681" marT="15681" marB="15681" anchor="ctr">
+                    <a:lnL w="6350" cap="flat" cmpd="sng" algn="ctr">
+                      <a:solidFill>
+                        <a:srgbClr val="E0E0E0"/>
+                      </a:solidFill>
+                      <a:prstDash val="solid"/>
+                      <a:round/>
+                      <a:headEnd type="none" w="med" len="med"/>
+                      <a:tailEnd type="none" w="med" len="med"/>
+                    </a:lnL>
+                    <a:lnR w="6350" cap="flat" cmpd="sng" algn="ctr">
+                      <a:solidFill>
+                        <a:srgbClr val="E0E0E0"/>
+                      </a:solidFill>
+                      <a:prstDash val="solid"/>
+                      <a:round/>
+                      <a:headEnd type="none" w="med" len="med"/>
+                      <a:tailEnd type="none" w="med" len="med"/>
+                    </a:lnR>
+                    <a:lnT w="6350" cap="flat" cmpd="sng" algn="ctr">
+                      <a:solidFill>
+                        <a:srgbClr val="E0E0E0"/>
+                      </a:solidFill>
+                      <a:prstDash val="solid"/>
+                      <a:round/>
+                      <a:headEnd type="none" w="med" len="med"/>
+                      <a:tailEnd type="none" w="med" len="med"/>
+                    </a:lnT>
+                    <a:lnB w="6350" cap="flat" cmpd="sng" algn="ctr">
+                      <a:solidFill>
+                        <a:srgbClr val="E0E0E0"/>
+                      </a:solidFill>
+                      <a:prstDash val="solid"/>
+                      <a:round/>
+                      <a:headEnd type="none" w="med" len="med"/>
+                      <a:tailEnd type="none" w="med" len="med"/>
+                    </a:lnB>
+                    <a:solidFill>
+                      <a:srgbClr val="FFFFFF"/>
+                    </a:solidFill>
+                  </a:tcPr>
+                </a:tc>
+                <a:extLst>
+                  <a:ext uri="{0D108BD9-81ED-4DB2-BD59-A6C34878D82A}">
+                    <a16:rowId xmlns:a16="http://schemas.microsoft.com/office/drawing/2014/main" val="1778919050"/>
+                  </a:ext>
+                </a:extLst>
+              </a:tr>
+            </a:tbl>
+          </a:graphicData>
+        </a:graphic>
+      </p:graphicFrame>
+      <p:sp>
+        <p:nvSpPr>
+          <p:cNvPr id="8" name="TextBox 7">
+            <a:extLst>
+              <a:ext uri="{FF2B5EF4-FFF2-40B4-BE49-F238E27FC236}">
+                <a16:creationId xmlns:a16="http://schemas.microsoft.com/office/drawing/2014/main" id="{F5B6B779-DA8F-4634-9BE5-CEDBDC056F9A}"/>
+              </a:ext>
+            </a:extLst>
+          </p:cNvPr>
+          <p:cNvSpPr txBox="1"/>
+          <p:nvPr/>
+        </p:nvSpPr>
+        <p:spPr>
+          <a:xfrm flipH="1">
+            <a:off x="9976198" y="3686145"/>
+            <a:ext cx="2444933" cy="400110"/>
+          </a:xfrm>
+          <a:prstGeom prst="rect">
+            <a:avLst/>
+          </a:prstGeom>
+          <a:noFill/>
+        </p:spPr>
+        <p:txBody>
+          <a:bodyPr wrap="square" rtlCol="0">
+            <a:spAutoFit/>
+          </a:bodyPr>
+          <a:lstStyle/>
+          <a:p>
+            <a:r>
+              <a:rPr lang="en-US" dirty="0"/>
+              <a:t>Help Desk</a:t>
             </a:r>
           </a:p>
         </p:txBody>
@@ -28766,15 +28658,6 @@
 </file>
 
 <file path=customXml/item1.xml><?xml version="1.0" encoding="utf-8"?>
-<?mso-contentType ?>
-<FormTemplates xmlns="http://schemas.microsoft.com/sharepoint/v3/contenttype/forms">
-  <Display>DocumentLibraryForm</Display>
-  <Edit>DocumentLibraryForm</Edit>
-  <New>DocumentLibraryForm</New>
-</FormTemplates>
-</file>
-
-<file path=customXml/item2.xml><?xml version="1.0" encoding="utf-8"?>
 <ct:contentTypeSchema xmlns:ct="http://schemas.microsoft.com/office/2006/metadata/contentType" xmlns:ma="http://schemas.microsoft.com/office/2006/metadata/properties/metaAttributes" ct:_="" ma:_="" ma:contentTypeName="Document" ma:contentTypeID="0x010100074387D78AC76C4289401EF66FB51FCC" ma:contentTypeVersion="15" ma:contentTypeDescription="Create a new document." ma:contentTypeScope="" ma:versionID="d3659bec8b8330148a03d82a9d99f412">
   <xsd:schema xmlns:xsd="http://www.w3.org/2001/XMLSchema" xmlns:xs="http://www.w3.org/2001/XMLSchema" xmlns:p="http://schemas.microsoft.com/office/2006/metadata/properties" xmlns:ns3="92c41bee-f0ee-4aa6-9399-a35fbb883510" xmlns:ns4="e06ed288-fd75-4b50-bbed-f5a5df88c31c" targetNamespace="http://schemas.microsoft.com/office/2006/metadata/properties" ma:root="true" ma:fieldsID="1a21d371127b63848c9a2290f5945250" ns3:_="" ns4:_="">
     <xsd:import namespace="92c41bee-f0ee-4aa6-9399-a35fbb883510"/>
@@ -29009,6 +28892,15 @@
 </ct:contentTypeSchema>
 </file>
 
+<file path=customXml/item2.xml><?xml version="1.0" encoding="utf-8"?>
+<?mso-contentType ?>
+<FormTemplates xmlns="http://schemas.microsoft.com/sharepoint/v3/contenttype/forms">
+  <Display>DocumentLibraryForm</Display>
+  <Edit>DocumentLibraryForm</Edit>
+  <New>DocumentLibraryForm</New>
+</FormTemplates>
+</file>
+
 <file path=customXml/item3.xml><?xml version="1.0" encoding="utf-8"?>
 <p:properties xmlns:p="http://schemas.microsoft.com/office/2006/metadata/properties" xmlns:xsi="http://www.w3.org/2001/XMLSchema-instance" xmlns:pc="http://schemas.microsoft.com/office/infopath/2007/PartnerControls">
   <documentManagement>
@@ -29018,14 +28910,6 @@
 </file>
 
 <file path=customXml/itemProps1.xml><?xml version="1.0" encoding="utf-8"?>
-<ds:datastoreItem xmlns:ds="http://schemas.openxmlformats.org/officeDocument/2006/customXml" ds:itemID="{CF03D735-5A05-4BC5-A99E-391417C85C40}">
-  <ds:schemaRefs>
-    <ds:schemaRef ds:uri="http://schemas.microsoft.com/sharepoint/v3/contenttype/forms"/>
-  </ds:schemaRefs>
-</ds:datastoreItem>
-</file>
-
-<file path=customXml/itemProps2.xml><?xml version="1.0" encoding="utf-8"?>
 <ds:datastoreItem xmlns:ds="http://schemas.openxmlformats.org/officeDocument/2006/customXml" ds:itemID="{185BC29D-55C2-4C81-AED5-94F36A04A0B1}">
   <ds:schemaRefs>
     <ds:schemaRef ds:uri="http://schemas.microsoft.com/office/2006/metadata/contentType"/>
@@ -29044,19 +28928,27 @@
 </ds:datastoreItem>
 </file>
 
+<file path=customXml/itemProps2.xml><?xml version="1.0" encoding="utf-8"?>
+<ds:datastoreItem xmlns:ds="http://schemas.openxmlformats.org/officeDocument/2006/customXml" ds:itemID="{CF03D735-5A05-4BC5-A99E-391417C85C40}">
+  <ds:schemaRefs>
+    <ds:schemaRef ds:uri="http://schemas.microsoft.com/sharepoint/v3/contenttype/forms"/>
+  </ds:schemaRefs>
+</ds:datastoreItem>
+</file>
+
 <file path=customXml/itemProps3.xml><?xml version="1.0" encoding="utf-8"?>
 <ds:datastoreItem xmlns:ds="http://schemas.openxmlformats.org/officeDocument/2006/customXml" ds:itemID="{73C6A681-FC25-4C22-A5AF-B27E33BD5231}">
   <ds:schemaRefs>
+    <ds:schemaRef ds:uri="92c41bee-f0ee-4aa6-9399-a35fbb883510"/>
+    <ds:schemaRef ds:uri="http://purl.org/dc/terms/"/>
+    <ds:schemaRef ds:uri="http://www.w3.org/XML/1998/namespace"/>
+    <ds:schemaRef ds:uri="http://purl.org/dc/dcmitype/"/>
     <ds:schemaRef ds:uri="http://schemas.microsoft.com/office/2006/metadata/properties"/>
+    <ds:schemaRef ds:uri="http://schemas.openxmlformats.org/package/2006/metadata/core-properties"/>
     <ds:schemaRef ds:uri="http://schemas.microsoft.com/office/2006/documentManagement/types"/>
     <ds:schemaRef ds:uri="http://schemas.microsoft.com/office/infopath/2007/PartnerControls"/>
-    <ds:schemaRef ds:uri="http://schemas.openxmlformats.org/package/2006/metadata/core-properties"/>
     <ds:schemaRef ds:uri="e06ed288-fd75-4b50-bbed-f5a5df88c31c"/>
     <ds:schemaRef ds:uri="http://purl.org/dc/elements/1.1/"/>
-    <ds:schemaRef ds:uri="http://www.w3.org/XML/1998/namespace"/>
-    <ds:schemaRef ds:uri="92c41bee-f0ee-4aa6-9399-a35fbb883510"/>
-    <ds:schemaRef ds:uri="http://purl.org/dc/dcmitype/"/>
-    <ds:schemaRef ds:uri="http://purl.org/dc/terms/"/>
   </ds:schemaRefs>
 </ds:datastoreItem>
 </file>
</xml_diff>

<commit_message>
File Input lecture updated
</commit_message>
<xml_diff>
--- a/slides/On-Campus/07_01_FileInput.pptx
+++ b/slides/On-Campus/07_01_FileInput.pptx
@@ -151,50 +151,20 @@
 <file path=ppt/changesInfos/changesInfo1.xml><?xml version="1.0" encoding="utf-8"?>
 <pc:chgInfo xmlns:a="http://schemas.openxmlformats.org/drawingml/2006/main" xmlns:r="http://schemas.openxmlformats.org/officeDocument/2006/relationships" xmlns:ac="http://schemas.microsoft.com/office/drawing/2013/main/command" xmlns:pc="http://schemas.microsoft.com/office/powerpoint/2013/main/command">
   <pc:docChgLst>
-    <pc:chgData name="Marcia Moraes" userId="c9c67e8a-58e2-4733-9a1c-5d44fec4775b" providerId="ADAL" clId="{65A51C50-0255-4629-87C5-E90858C71A63}"/>
-  </pc:docChgLst>
-  <pc:docChgLst>
-    <pc:chgData name="Marcia Moraes" userId="c9c67e8a-58e2-4733-9a1c-5d44fec4775b" providerId="ADAL" clId="{0B329C1D-C484-4E29-AB46-188B481F43A0}"/>
-  </pc:docChgLst>
-  <pc:docChgLst>
-    <pc:chgData name="Marcia Moraes" userId="c9c67e8a-58e2-4733-9a1c-5d44fec4775b" providerId="ADAL" clId="{E45C26DC-0BD9-4717-BFEB-54C307A378F6}"/>
-    <pc:docChg chg="custSel modSld">
-      <pc:chgData name="Marcia Moraes" userId="c9c67e8a-58e2-4733-9a1c-5d44fec4775b" providerId="ADAL" clId="{E45C26DC-0BD9-4717-BFEB-54C307A378F6}" dt="2023-09-14T14:07:40.724" v="120" actId="1076"/>
+    <pc:chgData name="Marcia Moraes" userId="c9c67e8a-58e2-4733-9a1c-5d44fec4775b" providerId="ADAL" clId="{EFA7ED0A-D517-4865-A3B4-546C62D44996}"/>
+    <pc:docChg chg="modSld">
+      <pc:chgData name="Marcia Moraes" userId="c9c67e8a-58e2-4733-9a1c-5d44fec4775b" providerId="ADAL" clId="{EFA7ED0A-D517-4865-A3B4-546C62D44996}" dt="2024-02-16T17:41:53.534" v="2" actId="20577"/>
       <pc:docMkLst>
         <pc:docMk/>
       </pc:docMkLst>
-      <pc:sldChg chg="addSp modSp">
-        <pc:chgData name="Marcia Moraes" userId="c9c67e8a-58e2-4733-9a1c-5d44fec4775b" providerId="ADAL" clId="{E45C26DC-0BD9-4717-BFEB-54C307A378F6}" dt="2023-09-14T14:07:40.724" v="120" actId="1076"/>
+      <pc:sldChg chg="modSp">
+        <pc:chgData name="Marcia Moraes" userId="c9c67e8a-58e2-4733-9a1c-5d44fec4775b" providerId="ADAL" clId="{EFA7ED0A-D517-4865-A3B4-546C62D44996}" dt="2024-02-16T17:41:53.534" v="2" actId="20577"/>
         <pc:sldMkLst>
           <pc:docMk/>
           <pc:sldMk cId="926474781" sldId="266"/>
         </pc:sldMkLst>
-        <pc:spChg chg="mod">
-          <ac:chgData name="Marcia Moraes" userId="c9c67e8a-58e2-4733-9a1c-5d44fec4775b" providerId="ADAL" clId="{E45C26DC-0BD9-4717-BFEB-54C307A378F6}" dt="2023-09-14T14:07:40.724" v="120" actId="1076"/>
-          <ac:spMkLst>
-            <pc:docMk/>
-            <pc:sldMk cId="926474781" sldId="266"/>
-            <ac:spMk id="6" creationId="{A2494937-C0C7-4ABC-A6FF-48F67C26DCCE}"/>
-          </ac:spMkLst>
-        </pc:spChg>
-        <pc:spChg chg="add">
-          <ac:chgData name="Marcia Moraes" userId="c9c67e8a-58e2-4733-9a1c-5d44fec4775b" providerId="ADAL" clId="{E45C26DC-0BD9-4717-BFEB-54C307A378F6}" dt="2023-09-14T14:07:26.122" v="119"/>
-          <ac:spMkLst>
-            <pc:docMk/>
-            <pc:sldMk cId="926474781" sldId="266"/>
-            <ac:spMk id="8" creationId="{F5B6B779-DA8F-4634-9BE5-CEDBDC056F9A}"/>
-          </ac:spMkLst>
-        </pc:spChg>
-        <pc:spChg chg="mod">
-          <ac:chgData name="Marcia Moraes" userId="c9c67e8a-58e2-4733-9a1c-5d44fec4775b" providerId="ADAL" clId="{E45C26DC-0BD9-4717-BFEB-54C307A378F6}" dt="2023-09-14T14:04:57.757" v="117" actId="20577"/>
-          <ac:spMkLst>
-            <pc:docMk/>
-            <pc:sldMk cId="926474781" sldId="266"/>
-            <ac:spMk id="11" creationId="{BDA0DBC1-29A7-4498-B9AA-9B174D0FEC3E}"/>
-          </ac:spMkLst>
-        </pc:spChg>
-        <pc:graphicFrameChg chg="add">
-          <ac:chgData name="Marcia Moraes" userId="c9c67e8a-58e2-4733-9a1c-5d44fec4775b" providerId="ADAL" clId="{E45C26DC-0BD9-4717-BFEB-54C307A378F6}" dt="2023-09-14T14:07:26.122" v="119"/>
+        <pc:graphicFrameChg chg="modGraphic">
+          <ac:chgData name="Marcia Moraes" userId="c9c67e8a-58e2-4733-9a1c-5d44fec4775b" providerId="ADAL" clId="{EFA7ED0A-D517-4865-A3B4-546C62D44996}" dt="2024-02-16T17:41:53.534" v="2" actId="20577"/>
           <ac:graphicFrameMkLst>
             <pc:docMk/>
             <pc:sldMk cId="926474781" sldId="266"/>
@@ -203,6 +173,15 @@
         </pc:graphicFrameChg>
       </pc:sldChg>
     </pc:docChg>
+  </pc:docChgLst>
+  <pc:docChgLst>
+    <pc:chgData name="Marcia Moraes" userId="c9c67e8a-58e2-4733-9a1c-5d44fec4775b" providerId="ADAL" clId="{65A51C50-0255-4629-87C5-E90858C71A63}"/>
+  </pc:docChgLst>
+  <pc:docChgLst>
+    <pc:chgData name="Marcia Moraes" userId="c9c67e8a-58e2-4733-9a1c-5d44fec4775b" providerId="ADAL" clId="{0B329C1D-C484-4E29-AB46-188B481F43A0}"/>
+  </pc:docChgLst>
+  <pc:docChgLst>
+    <pc:chgData name="Marcia Moraes" userId="c9c67e8a-58e2-4733-9a1c-5d44fec4775b" providerId="ADAL" clId="{E45C26DC-0BD9-4717-BFEB-54C307A378F6}"/>
   </pc:docChgLst>
 </pc:chgInfo>
 </file>
@@ -289,7 +268,7 @@
           <a:p>
             <a:fld id="{4D7E51A5-B478-1E40-8CBB-0DAA8831E99D}" type="datetimeFigureOut">
               <a:rPr lang="en-US" smtClean="0"/>
-              <a:t>9/14/2023</a:t>
+              <a:t>2/16/2024</a:t>
             </a:fld>
             <a:endParaRPr lang="en-US"/>
           </a:p>
@@ -454,7 +433,7 @@
           <a:p>
             <a:fld id="{D0ED587F-861E-6740-9643-E3DDAE89B8D6}" type="datetimeFigureOut">
               <a:rPr lang="en-US" smtClean="0"/>
-              <a:t>9/14/2023</a:t>
+              <a:t>2/16/2024</a:t>
             </a:fld>
             <a:endParaRPr lang="en-US"/>
           </a:p>
@@ -21785,7 +21764,7 @@
           <p:nvPr>
             <p:extLst>
               <p:ext uri="{D42A27DB-BD31-4B8C-83A1-F6EECF244321}">
-                <p14:modId xmlns:p14="http://schemas.microsoft.com/office/powerpoint/2010/main" val="1736723798"/>
+                <p14:modId xmlns:p14="http://schemas.microsoft.com/office/powerpoint/2010/main" val="2926044675"/>
               </p:ext>
             </p:extLst>
           </p:nvPr>
@@ -22004,7 +21983,25 @@
                         <a:rPr lang="en-US" sz="1700">
                           <a:effectLst/>
                         </a:rPr>
-                        <a:t>12 PM - 2 PM : CSB 120</a:t>
+                        <a:t>3 </a:t>
+                      </a:r>
+                      <a:r>
+                        <a:rPr lang="en-US" sz="1700" dirty="0">
+                          <a:effectLst/>
+                        </a:rPr>
+                        <a:t>PM </a:t>
+                      </a:r>
+                      <a:r>
+                        <a:rPr lang="en-US" sz="1700">
+                          <a:effectLst/>
+                        </a:rPr>
+                        <a:t>- 5 </a:t>
+                      </a:r>
+                      <a:r>
+                        <a:rPr lang="en-US" sz="1700" dirty="0">
+                          <a:effectLst/>
+                        </a:rPr>
+                        <a:t>PM : CSB 120</a:t>
                       </a:r>
                     </a:p>
                   </a:txBody>
@@ -28658,6 +28655,23 @@
 </file>
 
 <file path=customXml/item1.xml><?xml version="1.0" encoding="utf-8"?>
+<p:properties xmlns:p="http://schemas.microsoft.com/office/2006/metadata/properties" xmlns:xsi="http://www.w3.org/2001/XMLSchema-instance" xmlns:pc="http://schemas.microsoft.com/office/infopath/2007/PartnerControls">
+  <documentManagement>
+    <_activity xmlns="92c41bee-f0ee-4aa6-9399-a35fbb883510" xsi:nil="true"/>
+  </documentManagement>
+</p:properties>
+</file>
+
+<file path=customXml/item2.xml><?xml version="1.0" encoding="utf-8"?>
+<?mso-contentType ?>
+<FormTemplates xmlns="http://schemas.microsoft.com/sharepoint/v3/contenttype/forms">
+  <Display>DocumentLibraryForm</Display>
+  <Edit>DocumentLibraryForm</Edit>
+  <New>DocumentLibraryForm</New>
+</FormTemplates>
+</file>
+
+<file path=customXml/item3.xml><?xml version="1.0" encoding="utf-8"?>
 <ct:contentTypeSchema xmlns:ct="http://schemas.microsoft.com/office/2006/metadata/contentType" xmlns:ma="http://schemas.microsoft.com/office/2006/metadata/properties/metaAttributes" ct:_="" ma:_="" ma:contentTypeName="Document" ma:contentTypeID="0x010100074387D78AC76C4289401EF66FB51FCC" ma:contentTypeVersion="15" ma:contentTypeDescription="Create a new document." ma:contentTypeScope="" ma:versionID="d3659bec8b8330148a03d82a9d99f412">
   <xsd:schema xmlns:xsd="http://www.w3.org/2001/XMLSchema" xmlns:xs="http://www.w3.org/2001/XMLSchema" xmlns:p="http://schemas.microsoft.com/office/2006/metadata/properties" xmlns:ns3="92c41bee-f0ee-4aa6-9399-a35fbb883510" xmlns:ns4="e06ed288-fd75-4b50-bbed-f5a5df88c31c" targetNamespace="http://schemas.microsoft.com/office/2006/metadata/properties" ma:root="true" ma:fieldsID="1a21d371127b63848c9a2290f5945250" ns3:_="" ns4:_="">
     <xsd:import namespace="92c41bee-f0ee-4aa6-9399-a35fbb883510"/>
@@ -28892,24 +28906,32 @@
 </ct:contentTypeSchema>
 </file>
 
-<file path=customXml/item2.xml><?xml version="1.0" encoding="utf-8"?>
-<?mso-contentType ?>
-<FormTemplates xmlns="http://schemas.microsoft.com/sharepoint/v3/contenttype/forms">
-  <Display>DocumentLibraryForm</Display>
-  <Edit>DocumentLibraryForm</Edit>
-  <New>DocumentLibraryForm</New>
-</FormTemplates>
+<file path=customXml/itemProps1.xml><?xml version="1.0" encoding="utf-8"?>
+<ds:datastoreItem xmlns:ds="http://schemas.openxmlformats.org/officeDocument/2006/customXml" ds:itemID="{73C6A681-FC25-4C22-A5AF-B27E33BD5231}">
+  <ds:schemaRefs>
+    <ds:schemaRef ds:uri="http://purl.org/dc/terms/"/>
+    <ds:schemaRef ds:uri="e06ed288-fd75-4b50-bbed-f5a5df88c31c"/>
+    <ds:schemaRef ds:uri="http://schemas.microsoft.com/office/2006/documentManagement/types"/>
+    <ds:schemaRef ds:uri="http://schemas.openxmlformats.org/package/2006/metadata/core-properties"/>
+    <ds:schemaRef ds:uri="http://schemas.microsoft.com/office/infopath/2007/PartnerControls"/>
+    <ds:schemaRef ds:uri="http://purl.org/dc/elements/1.1/"/>
+    <ds:schemaRef ds:uri="http://purl.org/dc/dcmitype/"/>
+    <ds:schemaRef ds:uri="92c41bee-f0ee-4aa6-9399-a35fbb883510"/>
+    <ds:schemaRef ds:uri="http://schemas.microsoft.com/office/2006/metadata/properties"/>
+    <ds:schemaRef ds:uri="http://www.w3.org/XML/1998/namespace"/>
+  </ds:schemaRefs>
+</ds:datastoreItem>
 </file>
 
-<file path=customXml/item3.xml><?xml version="1.0" encoding="utf-8"?>
-<p:properties xmlns:p="http://schemas.microsoft.com/office/2006/metadata/properties" xmlns:xsi="http://www.w3.org/2001/XMLSchema-instance" xmlns:pc="http://schemas.microsoft.com/office/infopath/2007/PartnerControls">
-  <documentManagement>
-    <_activity xmlns="92c41bee-f0ee-4aa6-9399-a35fbb883510" xsi:nil="true"/>
-  </documentManagement>
-</p:properties>
+<file path=customXml/itemProps2.xml><?xml version="1.0" encoding="utf-8"?>
+<ds:datastoreItem xmlns:ds="http://schemas.openxmlformats.org/officeDocument/2006/customXml" ds:itemID="{CF03D735-5A05-4BC5-A99E-391417C85C40}">
+  <ds:schemaRefs>
+    <ds:schemaRef ds:uri="http://schemas.microsoft.com/sharepoint/v3/contenttype/forms"/>
+  </ds:schemaRefs>
+</ds:datastoreItem>
 </file>
 
-<file path=customXml/itemProps1.xml><?xml version="1.0" encoding="utf-8"?>
+<file path=customXml/itemProps3.xml><?xml version="1.0" encoding="utf-8"?>
 <ds:datastoreItem xmlns:ds="http://schemas.openxmlformats.org/officeDocument/2006/customXml" ds:itemID="{185BC29D-55C2-4C81-AED5-94F36A04A0B1}">
   <ds:schemaRefs>
     <ds:schemaRef ds:uri="http://schemas.microsoft.com/office/2006/metadata/contentType"/>
@@ -28926,29 +28948,4 @@
     <ds:schemaRef ds:uri="http://schemas.microsoft.com/internal/obd"/>
   </ds:schemaRefs>
 </ds:datastoreItem>
-</file>
-
-<file path=customXml/itemProps2.xml><?xml version="1.0" encoding="utf-8"?>
-<ds:datastoreItem xmlns:ds="http://schemas.openxmlformats.org/officeDocument/2006/customXml" ds:itemID="{CF03D735-5A05-4BC5-A99E-391417C85C40}">
-  <ds:schemaRefs>
-    <ds:schemaRef ds:uri="http://schemas.microsoft.com/sharepoint/v3/contenttype/forms"/>
-  </ds:schemaRefs>
-</ds:datastoreItem>
-</file>
-
-<file path=customXml/itemProps3.xml><?xml version="1.0" encoding="utf-8"?>
-<ds:datastoreItem xmlns:ds="http://schemas.openxmlformats.org/officeDocument/2006/customXml" ds:itemID="{73C6A681-FC25-4C22-A5AF-B27E33BD5231}">
-  <ds:schemaRefs>
-    <ds:schemaRef ds:uri="92c41bee-f0ee-4aa6-9399-a35fbb883510"/>
-    <ds:schemaRef ds:uri="http://purl.org/dc/terms/"/>
-    <ds:schemaRef ds:uri="http://www.w3.org/XML/1998/namespace"/>
-    <ds:schemaRef ds:uri="http://purl.org/dc/dcmitype/"/>
-    <ds:schemaRef ds:uri="http://schemas.microsoft.com/office/2006/metadata/properties"/>
-    <ds:schemaRef ds:uri="http://schemas.openxmlformats.org/package/2006/metadata/core-properties"/>
-    <ds:schemaRef ds:uri="http://schemas.microsoft.com/office/2006/documentManagement/types"/>
-    <ds:schemaRef ds:uri="http://schemas.microsoft.com/office/infopath/2007/PartnerControls"/>
-    <ds:schemaRef ds:uri="e06ed288-fd75-4b50-bbed-f5a5df88c31c"/>
-    <ds:schemaRef ds:uri="http://purl.org/dc/elements/1.1/"/>
-  </ds:schemaRefs>
-</ds:datastoreItem>
 </file>
</xml_diff>